<commit_message>
Modify description in index file number 16 and ppt file number 15
</commit_message>
<xml_diff>
--- a/15 - LocalStorage/Description.pptx
+++ b/15 - LocalStorage/Description.pptx
@@ -5,18 +5,15 @@
     <p:sldMasterId id="2147483648" r:id="rId1"/>
   </p:sldMasterIdLst>
   <p:notesMasterIdLst>
-    <p:notesMasterId r:id="rId11"/>
+    <p:notesMasterId r:id="rId8"/>
   </p:notesMasterIdLst>
   <p:sldIdLst>
-    <p:sldId id="277" r:id="rId2"/>
-    <p:sldId id="278" r:id="rId3"/>
-    <p:sldId id="279" r:id="rId4"/>
-    <p:sldId id="280" r:id="rId5"/>
-    <p:sldId id="284" r:id="rId6"/>
-    <p:sldId id="281" r:id="rId7"/>
-    <p:sldId id="282" r:id="rId8"/>
-    <p:sldId id="283" r:id="rId9"/>
-    <p:sldId id="285" r:id="rId10"/>
+    <p:sldId id="280" r:id="rId2"/>
+    <p:sldId id="284" r:id="rId3"/>
+    <p:sldId id="281" r:id="rId4"/>
+    <p:sldId id="282" r:id="rId5"/>
+    <p:sldId id="283" r:id="rId6"/>
+    <p:sldId id="285" r:id="rId7"/>
   </p:sldIdLst>
   <p:sldSz cx="12192000" cy="6858000"/>
   <p:notesSz cx="6858000" cy="9144000"/>
@@ -205,7 +202,7 @@
           <a:p>
             <a:fld id="{0C87EFF6-E52D-4F31-9BAF-F6F577E8B66E}" type="datetimeFigureOut">
               <a:rPr lang="ko-KR" altLang="en-US" smtClean="0"/>
-              <a:t>2020-04-06</a:t>
+              <a:t>2020-04-07</a:t>
             </a:fld>
             <a:endParaRPr lang="ko-KR" altLang="en-US"/>
           </a:p>
@@ -472,90 +469,6 @@
 </p:notesMaster>
 </file>
 
-<file path=ppt/notesSlides/notesSlide1.xml><?xml version="1.0" encoding="utf-8"?>
-<p:notes xmlns:a="http://schemas.openxmlformats.org/drawingml/2006/main" xmlns:r="http://schemas.openxmlformats.org/officeDocument/2006/relationships" xmlns:p="http://schemas.openxmlformats.org/presentationml/2006/main">
-  <p:cSld>
-    <p:spTree>
-      <p:nvGrpSpPr>
-        <p:cNvPr id="1" name=""/>
-        <p:cNvGrpSpPr/>
-        <p:nvPr/>
-      </p:nvGrpSpPr>
-      <p:grpSpPr>
-        <a:xfrm>
-          <a:off x="0" y="0"/>
-          <a:ext cx="0" cy="0"/>
-          <a:chOff x="0" y="0"/>
-          <a:chExt cx="0" cy="0"/>
-        </a:xfrm>
-      </p:grpSpPr>
-      <p:sp>
-        <p:nvSpPr>
-          <p:cNvPr id="2" name="슬라이드 이미지 개체 틀 1"/>
-          <p:cNvSpPr>
-            <a:spLocks noGrp="1" noRot="1" noChangeAspect="1"/>
-          </p:cNvSpPr>
-          <p:nvPr>
-            <p:ph type="sldImg"/>
-          </p:nvPr>
-        </p:nvSpPr>
-        <p:spPr/>
-      </p:sp>
-      <p:sp>
-        <p:nvSpPr>
-          <p:cNvPr id="3" name="슬라이드 노트 개체 틀 2"/>
-          <p:cNvSpPr>
-            <a:spLocks noGrp="1"/>
-          </p:cNvSpPr>
-          <p:nvPr>
-            <p:ph type="body" idx="1"/>
-          </p:nvPr>
-        </p:nvSpPr>
-        <p:spPr/>
-        <p:txBody>
-          <a:bodyPr/>
-          <a:lstStyle/>
-          <a:p>
-            <a:endParaRPr lang="ko-KR" altLang="en-US" dirty="0"/>
-          </a:p>
-        </p:txBody>
-      </p:sp>
-      <p:sp>
-        <p:nvSpPr>
-          <p:cNvPr id="4" name="슬라이드 번호 개체 틀 3"/>
-          <p:cNvSpPr>
-            <a:spLocks noGrp="1"/>
-          </p:cNvSpPr>
-          <p:nvPr>
-            <p:ph type="sldNum" sz="quarter" idx="5"/>
-          </p:nvPr>
-        </p:nvSpPr>
-        <p:spPr/>
-        <p:txBody>
-          <a:bodyPr/>
-          <a:lstStyle/>
-          <a:p>
-            <a:fld id="{DD2C1F53-8E2D-473E-8D51-2E5DEFEE58BD}" type="slidenum">
-              <a:rPr lang="ko-KR" altLang="en-US" smtClean="0"/>
-              <a:t>3</a:t>
-            </a:fld>
-            <a:endParaRPr lang="ko-KR" altLang="en-US"/>
-          </a:p>
-        </p:txBody>
-      </p:sp>
-    </p:spTree>
-    <p:extLst>
-      <p:ext uri="{BB962C8B-B14F-4D97-AF65-F5344CB8AC3E}">
-        <p14:creationId xmlns:p14="http://schemas.microsoft.com/office/powerpoint/2010/main" val="4156421077"/>
-      </p:ext>
-    </p:extLst>
-  </p:cSld>
-  <p:clrMapOvr>
-    <a:masterClrMapping/>
-  </p:clrMapOvr>
-</p:notes>
-</file>
-
 <file path=ppt/slideLayouts/slideLayout1.xml><?xml version="1.0" encoding="utf-8"?>
 <p:sldLayout xmlns:a="http://schemas.openxmlformats.org/drawingml/2006/main" xmlns:r="http://schemas.openxmlformats.org/officeDocument/2006/relationships" xmlns:p="http://schemas.openxmlformats.org/presentationml/2006/main" type="title" preserve="1">
   <p:cSld name="제목 슬라이드">
@@ -703,7 +616,7 @@
           <a:p>
             <a:fld id="{F6A943B9-3DDC-4480-9F2E-621F533D3898}" type="datetimeFigureOut">
               <a:rPr lang="ko-KR" altLang="en-US" smtClean="0"/>
-              <a:t>2020-04-06</a:t>
+              <a:t>2020-04-07</a:t>
             </a:fld>
             <a:endParaRPr lang="ko-KR" altLang="en-US"/>
           </a:p>
@@ -901,7 +814,7 @@
           <a:p>
             <a:fld id="{F6A943B9-3DDC-4480-9F2E-621F533D3898}" type="datetimeFigureOut">
               <a:rPr lang="ko-KR" altLang="en-US" smtClean="0"/>
-              <a:t>2020-04-06</a:t>
+              <a:t>2020-04-07</a:t>
             </a:fld>
             <a:endParaRPr lang="ko-KR" altLang="en-US"/>
           </a:p>
@@ -1109,7 +1022,7 @@
           <a:p>
             <a:fld id="{F6A943B9-3DDC-4480-9F2E-621F533D3898}" type="datetimeFigureOut">
               <a:rPr lang="ko-KR" altLang="en-US" smtClean="0"/>
-              <a:t>2020-04-06</a:t>
+              <a:t>2020-04-07</a:t>
             </a:fld>
             <a:endParaRPr lang="ko-KR" altLang="en-US"/>
           </a:p>
@@ -1307,7 +1220,7 @@
           <a:p>
             <a:fld id="{F6A943B9-3DDC-4480-9F2E-621F533D3898}" type="datetimeFigureOut">
               <a:rPr lang="ko-KR" altLang="en-US" smtClean="0"/>
-              <a:t>2020-04-06</a:t>
+              <a:t>2020-04-07</a:t>
             </a:fld>
             <a:endParaRPr lang="ko-KR" altLang="en-US"/>
           </a:p>
@@ -1582,7 +1495,7 @@
           <a:p>
             <a:fld id="{F6A943B9-3DDC-4480-9F2E-621F533D3898}" type="datetimeFigureOut">
               <a:rPr lang="ko-KR" altLang="en-US" smtClean="0"/>
-              <a:t>2020-04-06</a:t>
+              <a:t>2020-04-07</a:t>
             </a:fld>
             <a:endParaRPr lang="ko-KR" altLang="en-US"/>
           </a:p>
@@ -1847,7 +1760,7 @@
           <a:p>
             <a:fld id="{F6A943B9-3DDC-4480-9F2E-621F533D3898}" type="datetimeFigureOut">
               <a:rPr lang="ko-KR" altLang="en-US" smtClean="0"/>
-              <a:t>2020-04-06</a:t>
+              <a:t>2020-04-07</a:t>
             </a:fld>
             <a:endParaRPr lang="ko-KR" altLang="en-US"/>
           </a:p>
@@ -2259,7 +2172,7 @@
           <a:p>
             <a:fld id="{F6A943B9-3DDC-4480-9F2E-621F533D3898}" type="datetimeFigureOut">
               <a:rPr lang="ko-KR" altLang="en-US" smtClean="0"/>
-              <a:t>2020-04-06</a:t>
+              <a:t>2020-04-07</a:t>
             </a:fld>
             <a:endParaRPr lang="ko-KR" altLang="en-US"/>
           </a:p>
@@ -2400,7 +2313,7 @@
           <a:p>
             <a:fld id="{F6A943B9-3DDC-4480-9F2E-621F533D3898}" type="datetimeFigureOut">
               <a:rPr lang="ko-KR" altLang="en-US" smtClean="0"/>
-              <a:t>2020-04-06</a:t>
+              <a:t>2020-04-07</a:t>
             </a:fld>
             <a:endParaRPr lang="ko-KR" altLang="en-US"/>
           </a:p>
@@ -2513,7 +2426,7 @@
           <a:p>
             <a:fld id="{F6A943B9-3DDC-4480-9F2E-621F533D3898}" type="datetimeFigureOut">
               <a:rPr lang="ko-KR" altLang="en-US" smtClean="0"/>
-              <a:t>2020-04-06</a:t>
+              <a:t>2020-04-07</a:t>
             </a:fld>
             <a:endParaRPr lang="ko-KR" altLang="en-US"/>
           </a:p>
@@ -2824,7 +2737,7 @@
           <a:p>
             <a:fld id="{F6A943B9-3DDC-4480-9F2E-621F533D3898}" type="datetimeFigureOut">
               <a:rPr lang="ko-KR" altLang="en-US" smtClean="0"/>
-              <a:t>2020-04-06</a:t>
+              <a:t>2020-04-07</a:t>
             </a:fld>
             <a:endParaRPr lang="ko-KR" altLang="en-US"/>
           </a:p>
@@ -3112,7 +3025,7 @@
           <a:p>
             <a:fld id="{F6A943B9-3DDC-4480-9F2E-621F533D3898}" type="datetimeFigureOut">
               <a:rPr lang="ko-KR" altLang="en-US" smtClean="0"/>
-              <a:t>2020-04-06</a:t>
+              <a:t>2020-04-07</a:t>
             </a:fld>
             <a:endParaRPr lang="ko-KR" altLang="en-US"/>
           </a:p>
@@ -3353,7 +3266,7 @@
           <a:p>
             <a:fld id="{F6A943B9-3DDC-4480-9F2E-621F533D3898}" type="datetimeFigureOut">
               <a:rPr lang="ko-KR" altLang="en-US" smtClean="0"/>
-              <a:t>2020-04-06</a:t>
+              <a:t>2020-04-07</a:t>
             </a:fld>
             <a:endParaRPr lang="ko-KR" altLang="en-US"/>
           </a:p>
@@ -3754,2468 +3667,6 @@
 </file>
 
 <file path=ppt/slides/slide1.xml><?xml version="1.0" encoding="utf-8"?>
-<p:sld xmlns:a="http://schemas.openxmlformats.org/drawingml/2006/main" xmlns:r="http://schemas.openxmlformats.org/officeDocument/2006/relationships" xmlns:p="http://schemas.openxmlformats.org/presentationml/2006/main">
-  <p:cSld>
-    <p:spTree>
-      <p:nvGrpSpPr>
-        <p:cNvPr id="1" name=""/>
-        <p:cNvGrpSpPr/>
-        <p:nvPr/>
-      </p:nvGrpSpPr>
-      <p:grpSpPr>
-        <a:xfrm>
-          <a:off x="0" y="0"/>
-          <a:ext cx="0" cy="0"/>
-          <a:chOff x="0" y="0"/>
-          <a:chExt cx="0" cy="0"/>
-        </a:xfrm>
-      </p:grpSpPr>
-      <p:sp>
-        <p:nvSpPr>
-          <p:cNvPr id="3" name="TextBox 2">
-            <a:extLst>
-              <a:ext uri="{FF2B5EF4-FFF2-40B4-BE49-F238E27FC236}">
-                <a16:creationId xmlns:a16="http://schemas.microsoft.com/office/drawing/2014/main" id="{9E8B2DA2-3309-4250-B36F-8CAB167E476E}"/>
-              </a:ext>
-            </a:extLst>
-          </p:cNvPr>
-          <p:cNvSpPr txBox="1"/>
-          <p:nvPr/>
-        </p:nvSpPr>
-        <p:spPr>
-          <a:xfrm>
-            <a:off x="372862" y="328474"/>
-            <a:ext cx="2858475" cy="400110"/>
-          </a:xfrm>
-          <a:prstGeom prst="rect">
-            <a:avLst/>
-          </a:prstGeom>
-          <a:noFill/>
-        </p:spPr>
-        <p:txBody>
-          <a:bodyPr wrap="none" rtlCol="0">
-            <a:spAutoFit/>
-          </a:bodyPr>
-          <a:lstStyle/>
-          <a:p>
-            <a:r>
-              <a:rPr lang="en-US" altLang="ko-KR" sz="2000" b="1" dirty="0"/>
-              <a:t>Using Video Elements</a:t>
-            </a:r>
-            <a:endParaRPr lang="ko-KR" altLang="en-US" sz="2000" b="1" dirty="0"/>
-          </a:p>
-        </p:txBody>
-      </p:sp>
-      <p:pic>
-        <p:nvPicPr>
-          <p:cNvPr id="4" name="그림 3">
-            <a:extLst>
-              <a:ext uri="{FF2B5EF4-FFF2-40B4-BE49-F238E27FC236}">
-                <a16:creationId xmlns:a16="http://schemas.microsoft.com/office/drawing/2014/main" id="{88AD2B88-D5BC-44BE-B827-15834857E0D1}"/>
-              </a:ext>
-            </a:extLst>
-          </p:cNvPr>
-          <p:cNvPicPr>
-            <a:picLocks noChangeAspect="1"/>
-          </p:cNvPicPr>
-          <p:nvPr/>
-        </p:nvPicPr>
-        <p:blipFill>
-          <a:blip r:embed="rId2"/>
-          <a:stretch>
-            <a:fillRect/>
-          </a:stretch>
-        </p:blipFill>
-        <p:spPr>
-          <a:xfrm>
-            <a:off x="372862" y="913104"/>
-            <a:ext cx="8163161" cy="3558099"/>
-          </a:xfrm>
-          <a:prstGeom prst="rect">
-            <a:avLst/>
-          </a:prstGeom>
-        </p:spPr>
-      </p:pic>
-      <p:sp>
-        <p:nvSpPr>
-          <p:cNvPr id="7" name="TextBox 6">
-            <a:extLst>
-              <a:ext uri="{FF2B5EF4-FFF2-40B4-BE49-F238E27FC236}">
-                <a16:creationId xmlns:a16="http://schemas.microsoft.com/office/drawing/2014/main" id="{C1A22EC8-2F4F-4CFA-A899-8B55F00EA995}"/>
-              </a:ext>
-            </a:extLst>
-          </p:cNvPr>
-          <p:cNvSpPr txBox="1"/>
-          <p:nvPr/>
-        </p:nvSpPr>
-        <p:spPr>
-          <a:xfrm>
-            <a:off x="8544901" y="4455144"/>
-            <a:ext cx="3374642" cy="1077218"/>
-          </a:xfrm>
-          <a:prstGeom prst="rect">
-            <a:avLst/>
-          </a:prstGeom>
-          <a:noFill/>
-        </p:spPr>
-        <p:txBody>
-          <a:bodyPr wrap="none" rtlCol="0">
-            <a:spAutoFit/>
-          </a:bodyPr>
-          <a:lstStyle/>
-          <a:p>
-            <a:r>
-              <a:rPr lang="en-US" altLang="ko-KR" sz="1600" b="1" dirty="0" err="1">
-                <a:solidFill>
-                  <a:srgbClr val="002060"/>
-                </a:solidFill>
-              </a:rPr>
-              <a:t>Player__controls</a:t>
-            </a:r>
-            <a:endParaRPr lang="en-US" altLang="ko-KR" sz="1600" b="1" dirty="0">
-              <a:solidFill>
-                <a:srgbClr val="002060"/>
-              </a:solidFill>
-            </a:endParaRPr>
-          </a:p>
-          <a:p>
-            <a:r>
-              <a:rPr lang="en-US" altLang="ko-KR" sz="1600" b="1" dirty="0">
-                <a:solidFill>
-                  <a:srgbClr val="002060"/>
-                </a:solidFill>
-              </a:rPr>
-              <a:t> - display : flex</a:t>
-            </a:r>
-          </a:p>
-          <a:p>
-            <a:r>
-              <a:rPr lang="en-US" altLang="ko-KR" sz="1600" b="1" dirty="0">
-                <a:solidFill>
-                  <a:srgbClr val="002060"/>
-                </a:solidFill>
-              </a:rPr>
-              <a:t> - flex-wrap : wrap</a:t>
-            </a:r>
-          </a:p>
-          <a:p>
-            <a:r>
-              <a:rPr lang="en-US" altLang="ko-KR" sz="1600" b="1" dirty="0">
-                <a:solidFill>
-                  <a:srgbClr val="002060"/>
-                </a:solidFill>
-              </a:rPr>
-              <a:t>  =&gt; </a:t>
-            </a:r>
-            <a:r>
-              <a:rPr lang="ko-KR" altLang="en-US" sz="1600" b="1" dirty="0">
-                <a:solidFill>
-                  <a:srgbClr val="002060"/>
-                </a:solidFill>
-              </a:rPr>
-              <a:t>내부 요소가 벗어나지 않도록</a:t>
-            </a:r>
-            <a:endParaRPr lang="en-US" altLang="ko-KR" sz="1600" b="1" dirty="0">
-              <a:solidFill>
-                <a:srgbClr val="002060"/>
-              </a:solidFill>
-            </a:endParaRPr>
-          </a:p>
-        </p:txBody>
-      </p:sp>
-      <p:grpSp>
-        <p:nvGrpSpPr>
-          <p:cNvPr id="23" name="그룹 22">
-            <a:extLst>
-              <a:ext uri="{FF2B5EF4-FFF2-40B4-BE49-F238E27FC236}">
-                <a16:creationId xmlns:a16="http://schemas.microsoft.com/office/drawing/2014/main" id="{8C7B276D-77B1-49B2-A30D-546A96C385B3}"/>
-              </a:ext>
-            </a:extLst>
-          </p:cNvPr>
-          <p:cNvGrpSpPr/>
-          <p:nvPr/>
-        </p:nvGrpSpPr>
-        <p:grpSpPr>
-          <a:xfrm>
-            <a:off x="390616" y="4573348"/>
-            <a:ext cx="8163161" cy="2202277"/>
-            <a:chOff x="1313895" y="4573348"/>
-            <a:chExt cx="8163161" cy="2202277"/>
-          </a:xfrm>
-        </p:grpSpPr>
-        <p:sp>
-          <p:nvSpPr>
-            <p:cNvPr id="5" name="직사각형 4">
-              <a:extLst>
-                <a:ext uri="{FF2B5EF4-FFF2-40B4-BE49-F238E27FC236}">
-                  <a16:creationId xmlns:a16="http://schemas.microsoft.com/office/drawing/2014/main" id="{499EC729-7F3A-4AB7-8CD5-E60E1D2DD376}"/>
-                </a:ext>
-              </a:extLst>
-            </p:cNvPr>
-            <p:cNvSpPr/>
-            <p:nvPr/>
-          </p:nvSpPr>
-          <p:spPr>
-            <a:xfrm>
-              <a:off x="1313895" y="4573348"/>
-              <a:ext cx="8163161" cy="2202277"/>
-            </a:xfrm>
-            <a:prstGeom prst="rect">
-              <a:avLst/>
-            </a:prstGeom>
-            <a:noFill/>
-            <a:ln w="76200"/>
-          </p:spPr>
-          <p:style>
-            <a:lnRef idx="2">
-              <a:schemeClr val="accent1">
-                <a:shade val="50000"/>
-              </a:schemeClr>
-            </a:lnRef>
-            <a:fillRef idx="1">
-              <a:schemeClr val="accent1"/>
-            </a:fillRef>
-            <a:effectRef idx="0">
-              <a:schemeClr val="accent1"/>
-            </a:effectRef>
-            <a:fontRef idx="minor">
-              <a:schemeClr val="lt1"/>
-            </a:fontRef>
-          </p:style>
-          <p:txBody>
-            <a:bodyPr rtlCol="0" anchor="ctr"/>
-            <a:lstStyle/>
-            <a:p>
-              <a:pPr algn="ctr"/>
-              <a:endParaRPr lang="ko-KR" altLang="en-US"/>
-            </a:p>
-          </p:txBody>
-        </p:sp>
-        <p:sp>
-          <p:nvSpPr>
-            <p:cNvPr id="8" name="직사각형 7">
-              <a:extLst>
-                <a:ext uri="{FF2B5EF4-FFF2-40B4-BE49-F238E27FC236}">
-                  <a16:creationId xmlns:a16="http://schemas.microsoft.com/office/drawing/2014/main" id="{DE741CF8-09C4-46BB-B031-56D4A2CEE79C}"/>
-                </a:ext>
-              </a:extLst>
-            </p:cNvPr>
-            <p:cNvSpPr/>
-            <p:nvPr/>
-          </p:nvSpPr>
-          <p:spPr>
-            <a:xfrm>
-              <a:off x="1393794" y="4621597"/>
-              <a:ext cx="8031572" cy="1013247"/>
-            </a:xfrm>
-            <a:prstGeom prst="rect">
-              <a:avLst/>
-            </a:prstGeom>
-            <a:noFill/>
-            <a:ln w="76200">
-              <a:solidFill>
-                <a:srgbClr val="FFC000"/>
-              </a:solidFill>
-            </a:ln>
-          </p:spPr>
-          <p:style>
-            <a:lnRef idx="2">
-              <a:schemeClr val="accent1">
-                <a:shade val="50000"/>
-              </a:schemeClr>
-            </a:lnRef>
-            <a:fillRef idx="1">
-              <a:schemeClr val="accent1"/>
-            </a:fillRef>
-            <a:effectRef idx="0">
-              <a:schemeClr val="accent1"/>
-            </a:effectRef>
-            <a:fontRef idx="minor">
-              <a:schemeClr val="lt1"/>
-            </a:fontRef>
-          </p:style>
-          <p:txBody>
-            <a:bodyPr rtlCol="0" anchor="ctr"/>
-            <a:lstStyle/>
-            <a:p>
-              <a:pPr algn="ctr"/>
-              <a:endParaRPr lang="ko-KR" altLang="en-US"/>
-            </a:p>
-          </p:txBody>
-        </p:sp>
-        <p:sp>
-          <p:nvSpPr>
-            <p:cNvPr id="9" name="직사각형 8">
-              <a:extLst>
-                <a:ext uri="{FF2B5EF4-FFF2-40B4-BE49-F238E27FC236}">
-                  <a16:creationId xmlns:a16="http://schemas.microsoft.com/office/drawing/2014/main" id="{6120DA15-27EB-4DDB-B5A0-D2654561CE8F}"/>
-                </a:ext>
-              </a:extLst>
-            </p:cNvPr>
-            <p:cNvSpPr/>
-            <p:nvPr/>
-          </p:nvSpPr>
-          <p:spPr>
-            <a:xfrm>
-              <a:off x="1464679" y="4716309"/>
-              <a:ext cx="4083865" cy="830997"/>
-            </a:xfrm>
-            <a:prstGeom prst="rect">
-              <a:avLst/>
-            </a:prstGeom>
-            <a:noFill/>
-            <a:ln w="76200">
-              <a:solidFill>
-                <a:srgbClr val="FF0000"/>
-              </a:solidFill>
-            </a:ln>
-          </p:spPr>
-          <p:style>
-            <a:lnRef idx="2">
-              <a:schemeClr val="accent1">
-                <a:shade val="50000"/>
-              </a:schemeClr>
-            </a:lnRef>
-            <a:fillRef idx="1">
-              <a:schemeClr val="accent1"/>
-            </a:fillRef>
-            <a:effectRef idx="0">
-              <a:schemeClr val="accent1"/>
-            </a:effectRef>
-            <a:fontRef idx="minor">
-              <a:schemeClr val="lt1"/>
-            </a:fontRef>
-          </p:style>
-          <p:txBody>
-            <a:bodyPr rtlCol="0" anchor="ctr"/>
-            <a:lstStyle/>
-            <a:p>
-              <a:pPr algn="ctr"/>
-              <a:endParaRPr lang="ko-KR" altLang="en-US"/>
-            </a:p>
-          </p:txBody>
-        </p:sp>
-        <p:sp>
-          <p:nvSpPr>
-            <p:cNvPr id="10" name="TextBox 9">
-              <a:extLst>
-                <a:ext uri="{FF2B5EF4-FFF2-40B4-BE49-F238E27FC236}">
-                  <a16:creationId xmlns:a16="http://schemas.microsoft.com/office/drawing/2014/main" id="{18A61A47-AD78-4BB0-8E5A-A0BB09DB8504}"/>
-                </a:ext>
-              </a:extLst>
-            </p:cNvPr>
-            <p:cNvSpPr txBox="1"/>
-            <p:nvPr/>
-          </p:nvSpPr>
-          <p:spPr>
-            <a:xfrm>
-              <a:off x="8399572" y="5240092"/>
-              <a:ext cx="1025794" cy="338554"/>
-            </a:xfrm>
-            <a:prstGeom prst="rect">
-              <a:avLst/>
-            </a:prstGeom>
-            <a:noFill/>
-          </p:spPr>
-          <p:txBody>
-            <a:bodyPr wrap="none" rtlCol="0">
-              <a:spAutoFit/>
-            </a:bodyPr>
-            <a:lstStyle/>
-            <a:p>
-              <a:r>
-                <a:rPr lang="en-US" altLang="ko-KR" sz="1600" b="1" dirty="0">
-                  <a:solidFill>
-                    <a:srgbClr val="FFC000"/>
-                  </a:solidFill>
-                </a:rPr>
-                <a:t>Progress</a:t>
-              </a:r>
-            </a:p>
-          </p:txBody>
-        </p:sp>
-        <p:sp>
-          <p:nvSpPr>
-            <p:cNvPr id="11" name="TextBox 10">
-              <a:extLst>
-                <a:ext uri="{FF2B5EF4-FFF2-40B4-BE49-F238E27FC236}">
-                  <a16:creationId xmlns:a16="http://schemas.microsoft.com/office/drawing/2014/main" id="{5D659AC7-385E-4A81-AD36-F6879F13458A}"/>
-                </a:ext>
-              </a:extLst>
-            </p:cNvPr>
-            <p:cNvSpPr txBox="1"/>
-            <p:nvPr/>
-          </p:nvSpPr>
-          <p:spPr>
-            <a:xfrm>
-              <a:off x="1464679" y="5170782"/>
-              <a:ext cx="1687834" cy="338554"/>
-            </a:xfrm>
-            <a:prstGeom prst="rect">
-              <a:avLst/>
-            </a:prstGeom>
-            <a:noFill/>
-          </p:spPr>
-          <p:txBody>
-            <a:bodyPr wrap="none" rtlCol="0">
-              <a:spAutoFit/>
-            </a:bodyPr>
-            <a:lstStyle/>
-            <a:p>
-              <a:r>
-                <a:rPr lang="en-US" altLang="ko-KR" sz="1600" b="1" dirty="0" err="1">
-                  <a:solidFill>
-                    <a:srgbClr val="FF0000"/>
-                  </a:solidFill>
-                </a:rPr>
-                <a:t>Progress__filled</a:t>
-              </a:r>
-              <a:endParaRPr lang="en-US" altLang="ko-KR" sz="1600" b="1" dirty="0">
-                <a:solidFill>
-                  <a:srgbClr val="FF0000"/>
-                </a:solidFill>
-              </a:endParaRPr>
-            </a:p>
-          </p:txBody>
-        </p:sp>
-        <p:sp>
-          <p:nvSpPr>
-            <p:cNvPr id="12" name="직사각형 11">
-              <a:extLst>
-                <a:ext uri="{FF2B5EF4-FFF2-40B4-BE49-F238E27FC236}">
-                  <a16:creationId xmlns:a16="http://schemas.microsoft.com/office/drawing/2014/main" id="{3D53EEBC-908E-42EE-BCB2-F99126AF70E8}"/>
-                </a:ext>
-              </a:extLst>
-            </p:cNvPr>
-            <p:cNvSpPr/>
-            <p:nvPr/>
-          </p:nvSpPr>
-          <p:spPr>
-            <a:xfrm>
-              <a:off x="1396806" y="5697906"/>
-              <a:ext cx="1195474" cy="1013247"/>
-            </a:xfrm>
-            <a:prstGeom prst="rect">
-              <a:avLst/>
-            </a:prstGeom>
-            <a:noFill/>
-            <a:ln w="76200">
-              <a:solidFill>
-                <a:srgbClr val="FF0000"/>
-              </a:solidFill>
-            </a:ln>
-          </p:spPr>
-          <p:style>
-            <a:lnRef idx="2">
-              <a:schemeClr val="accent1">
-                <a:shade val="50000"/>
-              </a:schemeClr>
-            </a:lnRef>
-            <a:fillRef idx="1">
-              <a:schemeClr val="accent1"/>
-            </a:fillRef>
-            <a:effectRef idx="0">
-              <a:schemeClr val="accent1"/>
-            </a:effectRef>
-            <a:fontRef idx="minor">
-              <a:schemeClr val="lt1"/>
-            </a:fontRef>
-          </p:style>
-          <p:txBody>
-            <a:bodyPr rtlCol="0" anchor="ctr"/>
-            <a:lstStyle/>
-            <a:p>
-              <a:pPr algn="ctr"/>
-              <a:endParaRPr lang="ko-KR" altLang="en-US"/>
-            </a:p>
-          </p:txBody>
-        </p:sp>
-        <p:sp>
-          <p:nvSpPr>
-            <p:cNvPr id="13" name="TextBox 12">
-              <a:extLst>
-                <a:ext uri="{FF2B5EF4-FFF2-40B4-BE49-F238E27FC236}">
-                  <a16:creationId xmlns:a16="http://schemas.microsoft.com/office/drawing/2014/main" id="{C846EA00-03E8-464A-BD9C-ABE9EDA9E27A}"/>
-                </a:ext>
-              </a:extLst>
-            </p:cNvPr>
-            <p:cNvSpPr txBox="1"/>
-            <p:nvPr/>
-          </p:nvSpPr>
-          <p:spPr>
-            <a:xfrm>
-              <a:off x="1359224" y="6372599"/>
-              <a:ext cx="845809" cy="338554"/>
-            </a:xfrm>
-            <a:prstGeom prst="rect">
-              <a:avLst/>
-            </a:prstGeom>
-            <a:noFill/>
-          </p:spPr>
-          <p:txBody>
-            <a:bodyPr wrap="none" rtlCol="0">
-              <a:spAutoFit/>
-            </a:bodyPr>
-            <a:lstStyle/>
-            <a:p>
-              <a:r>
-                <a:rPr lang="en-US" altLang="ko-KR" sz="1600" b="1" dirty="0">
-                  <a:solidFill>
-                    <a:srgbClr val="FF0000"/>
-                  </a:solidFill>
-                </a:rPr>
-                <a:t>button</a:t>
-              </a:r>
-            </a:p>
-          </p:txBody>
-        </p:sp>
-        <p:sp>
-          <p:nvSpPr>
-            <p:cNvPr id="14" name="직사각형 13">
-              <a:extLst>
-                <a:ext uri="{FF2B5EF4-FFF2-40B4-BE49-F238E27FC236}">
-                  <a16:creationId xmlns:a16="http://schemas.microsoft.com/office/drawing/2014/main" id="{DF511CC3-2E63-4E27-9C53-0BF597A56543}"/>
-                </a:ext>
-              </a:extLst>
-            </p:cNvPr>
-            <p:cNvSpPr/>
-            <p:nvPr/>
-          </p:nvSpPr>
-          <p:spPr>
-            <a:xfrm>
-              <a:off x="2675191" y="5693754"/>
-              <a:ext cx="2198650" cy="1013247"/>
-            </a:xfrm>
-            <a:prstGeom prst="rect">
-              <a:avLst/>
-            </a:prstGeom>
-            <a:noFill/>
-            <a:ln w="76200">
-              <a:solidFill>
-                <a:srgbClr val="92D050"/>
-              </a:solidFill>
-            </a:ln>
-          </p:spPr>
-          <p:style>
-            <a:lnRef idx="2">
-              <a:schemeClr val="accent1">
-                <a:shade val="50000"/>
-              </a:schemeClr>
-            </a:lnRef>
-            <a:fillRef idx="1">
-              <a:schemeClr val="accent1"/>
-            </a:fillRef>
-            <a:effectRef idx="0">
-              <a:schemeClr val="accent1"/>
-            </a:effectRef>
-            <a:fontRef idx="minor">
-              <a:schemeClr val="lt1"/>
-            </a:fontRef>
-          </p:style>
-          <p:txBody>
-            <a:bodyPr rtlCol="0" anchor="ctr"/>
-            <a:lstStyle/>
-            <a:p>
-              <a:pPr algn="ctr"/>
-              <a:endParaRPr lang="ko-KR" altLang="en-US"/>
-            </a:p>
-          </p:txBody>
-        </p:sp>
-        <p:sp>
-          <p:nvSpPr>
-            <p:cNvPr id="15" name="직사각형 14">
-              <a:extLst>
-                <a:ext uri="{FF2B5EF4-FFF2-40B4-BE49-F238E27FC236}">
-                  <a16:creationId xmlns:a16="http://schemas.microsoft.com/office/drawing/2014/main" id="{1FB2596E-7701-4E6B-BDAC-6BDE904A8E26}"/>
-                </a:ext>
-              </a:extLst>
-            </p:cNvPr>
-            <p:cNvSpPr/>
-            <p:nvPr/>
-          </p:nvSpPr>
-          <p:spPr>
-            <a:xfrm>
-              <a:off x="4919068" y="5701120"/>
-              <a:ext cx="2198650" cy="1013247"/>
-            </a:xfrm>
-            <a:prstGeom prst="rect">
-              <a:avLst/>
-            </a:prstGeom>
-            <a:noFill/>
-            <a:ln w="76200">
-              <a:solidFill>
-                <a:srgbClr val="FF0000"/>
-              </a:solidFill>
-            </a:ln>
-          </p:spPr>
-          <p:style>
-            <a:lnRef idx="2">
-              <a:schemeClr val="accent1">
-                <a:shade val="50000"/>
-              </a:schemeClr>
-            </a:lnRef>
-            <a:fillRef idx="1">
-              <a:schemeClr val="accent1"/>
-            </a:fillRef>
-            <a:effectRef idx="0">
-              <a:schemeClr val="accent1"/>
-            </a:effectRef>
-            <a:fontRef idx="minor">
-              <a:schemeClr val="lt1"/>
-            </a:fontRef>
-          </p:style>
-          <p:txBody>
-            <a:bodyPr rtlCol="0" anchor="ctr"/>
-            <a:lstStyle/>
-            <a:p>
-              <a:pPr algn="ctr"/>
-              <a:endParaRPr lang="ko-KR" altLang="en-US"/>
-            </a:p>
-          </p:txBody>
-        </p:sp>
-        <p:sp>
-          <p:nvSpPr>
-            <p:cNvPr id="16" name="TextBox 15">
-              <a:extLst>
-                <a:ext uri="{FF2B5EF4-FFF2-40B4-BE49-F238E27FC236}">
-                  <a16:creationId xmlns:a16="http://schemas.microsoft.com/office/drawing/2014/main" id="{07276416-1144-4367-95B7-C53D8F1C0F0B}"/>
-                </a:ext>
-              </a:extLst>
-            </p:cNvPr>
-            <p:cNvSpPr txBox="1"/>
-            <p:nvPr/>
-          </p:nvSpPr>
-          <p:spPr>
-            <a:xfrm>
-              <a:off x="2660802" y="6372599"/>
-              <a:ext cx="1511376" cy="338554"/>
-            </a:xfrm>
-            <a:prstGeom prst="rect">
-              <a:avLst/>
-            </a:prstGeom>
-            <a:noFill/>
-          </p:spPr>
-          <p:txBody>
-            <a:bodyPr wrap="none" rtlCol="0">
-              <a:spAutoFit/>
-            </a:bodyPr>
-            <a:lstStyle/>
-            <a:p>
-              <a:r>
-                <a:rPr lang="en-US" altLang="ko-KR" sz="1600" b="1" dirty="0" err="1">
-                  <a:solidFill>
-                    <a:srgbClr val="FF0000"/>
-                  </a:solidFill>
-                </a:rPr>
-                <a:t>Input_volume</a:t>
-              </a:r>
-              <a:endParaRPr lang="en-US" altLang="ko-KR" sz="1600" b="1" dirty="0">
-                <a:solidFill>
-                  <a:srgbClr val="FF0000"/>
-                </a:solidFill>
-              </a:endParaRPr>
-            </a:p>
-          </p:txBody>
-        </p:sp>
-        <p:sp>
-          <p:nvSpPr>
-            <p:cNvPr id="17" name="TextBox 16">
-              <a:extLst>
-                <a:ext uri="{FF2B5EF4-FFF2-40B4-BE49-F238E27FC236}">
-                  <a16:creationId xmlns:a16="http://schemas.microsoft.com/office/drawing/2014/main" id="{01C2C1EA-4257-4796-B0D7-B59DF2962700}"/>
-                </a:ext>
-              </a:extLst>
-            </p:cNvPr>
-            <p:cNvSpPr txBox="1"/>
-            <p:nvPr/>
-          </p:nvSpPr>
-          <p:spPr>
-            <a:xfrm>
-              <a:off x="4867907" y="6368447"/>
-              <a:ext cx="2161041" cy="338554"/>
-            </a:xfrm>
-            <a:prstGeom prst="rect">
-              <a:avLst/>
-            </a:prstGeom>
-            <a:noFill/>
-          </p:spPr>
-          <p:txBody>
-            <a:bodyPr wrap="none" rtlCol="0">
-              <a:spAutoFit/>
-            </a:bodyPr>
-            <a:lstStyle/>
-            <a:p>
-              <a:r>
-                <a:rPr lang="en-US" altLang="ko-KR" sz="1600" b="1" dirty="0" err="1">
-                  <a:solidFill>
-                    <a:srgbClr val="FF0000"/>
-                  </a:solidFill>
-                </a:rPr>
-                <a:t>Input_playbackRate</a:t>
-              </a:r>
-              <a:endParaRPr lang="en-US" altLang="ko-KR" sz="1600" b="1" dirty="0">
-                <a:solidFill>
-                  <a:srgbClr val="FF0000"/>
-                </a:solidFill>
-              </a:endParaRPr>
-            </a:p>
-          </p:txBody>
-        </p:sp>
-        <p:sp>
-          <p:nvSpPr>
-            <p:cNvPr id="18" name="TextBox 17">
-              <a:extLst>
-                <a:ext uri="{FF2B5EF4-FFF2-40B4-BE49-F238E27FC236}">
-                  <a16:creationId xmlns:a16="http://schemas.microsoft.com/office/drawing/2014/main" id="{0C87AFDF-81C9-4436-B6E6-ECC3B5C6C74B}"/>
-                </a:ext>
-              </a:extLst>
-            </p:cNvPr>
-            <p:cNvSpPr txBox="1"/>
-            <p:nvPr/>
-          </p:nvSpPr>
-          <p:spPr>
-            <a:xfrm>
-              <a:off x="7220894" y="6368447"/>
-              <a:ext cx="845809" cy="338554"/>
-            </a:xfrm>
-            <a:prstGeom prst="rect">
-              <a:avLst/>
-            </a:prstGeom>
-            <a:noFill/>
-          </p:spPr>
-          <p:txBody>
-            <a:bodyPr wrap="none" rtlCol="0">
-              <a:spAutoFit/>
-            </a:bodyPr>
-            <a:lstStyle/>
-            <a:p>
-              <a:r>
-                <a:rPr lang="en-US" altLang="ko-KR" sz="1600" b="1" dirty="0">
-                  <a:solidFill>
-                    <a:srgbClr val="FF0000"/>
-                  </a:solidFill>
-                </a:rPr>
-                <a:t>button</a:t>
-              </a:r>
-            </a:p>
-          </p:txBody>
-        </p:sp>
-        <p:sp>
-          <p:nvSpPr>
-            <p:cNvPr id="19" name="직사각형 18">
-              <a:extLst>
-                <a:ext uri="{FF2B5EF4-FFF2-40B4-BE49-F238E27FC236}">
-                  <a16:creationId xmlns:a16="http://schemas.microsoft.com/office/drawing/2014/main" id="{C2EC238E-AE88-40A8-AB1B-864087641F3C}"/>
-                </a:ext>
-              </a:extLst>
-            </p:cNvPr>
-            <p:cNvSpPr/>
-            <p:nvPr/>
-          </p:nvSpPr>
-          <p:spPr>
-            <a:xfrm>
-              <a:off x="7180077" y="5700849"/>
-              <a:ext cx="1067278" cy="1013247"/>
-            </a:xfrm>
-            <a:prstGeom prst="rect">
-              <a:avLst/>
-            </a:prstGeom>
-            <a:noFill/>
-            <a:ln w="76200">
-              <a:solidFill>
-                <a:srgbClr val="92D050"/>
-              </a:solidFill>
-            </a:ln>
-          </p:spPr>
-          <p:style>
-            <a:lnRef idx="2">
-              <a:schemeClr val="accent1">
-                <a:shade val="50000"/>
-              </a:schemeClr>
-            </a:lnRef>
-            <a:fillRef idx="1">
-              <a:schemeClr val="accent1"/>
-            </a:fillRef>
-            <a:effectRef idx="0">
-              <a:schemeClr val="accent1"/>
-            </a:effectRef>
-            <a:fontRef idx="minor">
-              <a:schemeClr val="lt1"/>
-            </a:fontRef>
-          </p:style>
-          <p:txBody>
-            <a:bodyPr rtlCol="0" anchor="ctr"/>
-            <a:lstStyle/>
-            <a:p>
-              <a:pPr algn="ctr"/>
-              <a:endParaRPr lang="ko-KR" altLang="en-US"/>
-            </a:p>
-          </p:txBody>
-        </p:sp>
-        <p:sp>
-          <p:nvSpPr>
-            <p:cNvPr id="20" name="직사각형 19">
-              <a:extLst>
-                <a:ext uri="{FF2B5EF4-FFF2-40B4-BE49-F238E27FC236}">
-                  <a16:creationId xmlns:a16="http://schemas.microsoft.com/office/drawing/2014/main" id="{BBCCEE3F-7AE3-483D-97EE-CC03DCF3315B}"/>
-                </a:ext>
-              </a:extLst>
-            </p:cNvPr>
-            <p:cNvSpPr/>
-            <p:nvPr/>
-          </p:nvSpPr>
-          <p:spPr>
-            <a:xfrm>
-              <a:off x="8331347" y="5709727"/>
-              <a:ext cx="1067278" cy="1013247"/>
-            </a:xfrm>
-            <a:prstGeom prst="rect">
-              <a:avLst/>
-            </a:prstGeom>
-            <a:noFill/>
-            <a:ln w="76200">
-              <a:solidFill>
-                <a:srgbClr val="FF0000"/>
-              </a:solidFill>
-            </a:ln>
-          </p:spPr>
-          <p:style>
-            <a:lnRef idx="2">
-              <a:schemeClr val="accent1">
-                <a:shade val="50000"/>
-              </a:schemeClr>
-            </a:lnRef>
-            <a:fillRef idx="1">
-              <a:schemeClr val="accent1"/>
-            </a:fillRef>
-            <a:effectRef idx="0">
-              <a:schemeClr val="accent1"/>
-            </a:effectRef>
-            <a:fontRef idx="minor">
-              <a:schemeClr val="lt1"/>
-            </a:fontRef>
-          </p:style>
-          <p:txBody>
-            <a:bodyPr rtlCol="0" anchor="ctr"/>
-            <a:lstStyle/>
-            <a:p>
-              <a:pPr algn="ctr"/>
-              <a:endParaRPr lang="ko-KR" altLang="en-US"/>
-            </a:p>
-          </p:txBody>
-        </p:sp>
-        <p:sp>
-          <p:nvSpPr>
-            <p:cNvPr id="21" name="TextBox 20">
-              <a:extLst>
-                <a:ext uri="{FF2B5EF4-FFF2-40B4-BE49-F238E27FC236}">
-                  <a16:creationId xmlns:a16="http://schemas.microsoft.com/office/drawing/2014/main" id="{B00DBDE2-E08B-42FB-912C-2EE305726826}"/>
-                </a:ext>
-              </a:extLst>
-            </p:cNvPr>
-            <p:cNvSpPr txBox="1"/>
-            <p:nvPr/>
-          </p:nvSpPr>
-          <p:spPr>
-            <a:xfrm>
-              <a:off x="8395818" y="6368447"/>
-              <a:ext cx="845809" cy="338554"/>
-            </a:xfrm>
-            <a:prstGeom prst="rect">
-              <a:avLst/>
-            </a:prstGeom>
-            <a:noFill/>
-          </p:spPr>
-          <p:txBody>
-            <a:bodyPr wrap="none" rtlCol="0">
-              <a:spAutoFit/>
-            </a:bodyPr>
-            <a:lstStyle/>
-            <a:p>
-              <a:r>
-                <a:rPr lang="en-US" altLang="ko-KR" sz="1600" b="1" dirty="0">
-                  <a:solidFill>
-                    <a:srgbClr val="FF0000"/>
-                  </a:solidFill>
-                </a:rPr>
-                <a:t>button</a:t>
-              </a:r>
-            </a:p>
-          </p:txBody>
-        </p:sp>
-      </p:grpSp>
-    </p:spTree>
-    <p:extLst>
-      <p:ext uri="{BB962C8B-B14F-4D97-AF65-F5344CB8AC3E}">
-        <p14:creationId xmlns:p14="http://schemas.microsoft.com/office/powerpoint/2010/main" val="1738269472"/>
-      </p:ext>
-    </p:extLst>
-  </p:cSld>
-  <p:clrMapOvr>
-    <a:masterClrMapping/>
-  </p:clrMapOvr>
-</p:sld>
-</file>
-
-<file path=ppt/slides/slide2.xml><?xml version="1.0" encoding="utf-8"?>
-<p:sld xmlns:a="http://schemas.openxmlformats.org/drawingml/2006/main" xmlns:r="http://schemas.openxmlformats.org/officeDocument/2006/relationships" xmlns:p="http://schemas.openxmlformats.org/presentationml/2006/main">
-  <p:cSld>
-    <p:spTree>
-      <p:nvGrpSpPr>
-        <p:cNvPr id="1" name=""/>
-        <p:cNvGrpSpPr/>
-        <p:nvPr/>
-      </p:nvGrpSpPr>
-      <p:grpSpPr>
-        <a:xfrm>
-          <a:off x="0" y="0"/>
-          <a:ext cx="0" cy="0"/>
-          <a:chOff x="0" y="0"/>
-          <a:chExt cx="0" cy="0"/>
-        </a:xfrm>
-      </p:grpSpPr>
-      <p:sp>
-        <p:nvSpPr>
-          <p:cNvPr id="2" name="TextBox 1">
-            <a:extLst>
-              <a:ext uri="{FF2B5EF4-FFF2-40B4-BE49-F238E27FC236}">
-                <a16:creationId xmlns:a16="http://schemas.microsoft.com/office/drawing/2014/main" id="{C2285FBE-D1AC-4F0E-9D0B-8C7B247DEF50}"/>
-              </a:ext>
-            </a:extLst>
-          </p:cNvPr>
-          <p:cNvSpPr txBox="1"/>
-          <p:nvPr/>
-        </p:nvSpPr>
-        <p:spPr>
-          <a:xfrm>
-            <a:off x="372862" y="328474"/>
-            <a:ext cx="1712969" cy="400110"/>
-          </a:xfrm>
-          <a:prstGeom prst="rect">
-            <a:avLst/>
-          </a:prstGeom>
-          <a:noFill/>
-        </p:spPr>
-        <p:txBody>
-          <a:bodyPr wrap="none" rtlCol="0">
-            <a:spAutoFit/>
-          </a:bodyPr>
-          <a:lstStyle/>
-          <a:p>
-            <a:r>
-              <a:rPr lang="en-US" altLang="ko-KR" sz="2000" b="1" dirty="0"/>
-              <a:t>Confirm CSS</a:t>
-            </a:r>
-            <a:endParaRPr lang="ko-KR" altLang="en-US" sz="2000" b="1" dirty="0"/>
-          </a:p>
-        </p:txBody>
-      </p:sp>
-      <p:pic>
-        <p:nvPicPr>
-          <p:cNvPr id="4" name="그림 3">
-            <a:extLst>
-              <a:ext uri="{FF2B5EF4-FFF2-40B4-BE49-F238E27FC236}">
-                <a16:creationId xmlns:a16="http://schemas.microsoft.com/office/drawing/2014/main" id="{78B28AB1-3D3F-4648-A658-060B08935126}"/>
-              </a:ext>
-            </a:extLst>
-          </p:cNvPr>
-          <p:cNvPicPr>
-            <a:picLocks noChangeAspect="1"/>
-          </p:cNvPicPr>
-          <p:nvPr/>
-        </p:nvPicPr>
-        <p:blipFill>
-          <a:blip r:embed="rId2"/>
-          <a:stretch>
-            <a:fillRect/>
-          </a:stretch>
-        </p:blipFill>
-        <p:spPr>
-          <a:xfrm>
-            <a:off x="222893" y="910530"/>
-            <a:ext cx="3590925" cy="2914650"/>
-          </a:xfrm>
-          <a:prstGeom prst="rect">
-            <a:avLst/>
-          </a:prstGeom>
-        </p:spPr>
-      </p:pic>
-      <p:grpSp>
-        <p:nvGrpSpPr>
-          <p:cNvPr id="19" name="그룹 18">
-            <a:extLst>
-              <a:ext uri="{FF2B5EF4-FFF2-40B4-BE49-F238E27FC236}">
-                <a16:creationId xmlns:a16="http://schemas.microsoft.com/office/drawing/2014/main" id="{EC7605DA-380B-4AFF-B712-1B4AEFC76E75}"/>
-              </a:ext>
-            </a:extLst>
-          </p:cNvPr>
-          <p:cNvGrpSpPr/>
-          <p:nvPr/>
-        </p:nvGrpSpPr>
-        <p:grpSpPr>
-          <a:xfrm>
-            <a:off x="3830110" y="2717182"/>
-            <a:ext cx="4418904" cy="3762375"/>
-            <a:chOff x="3910012" y="2717182"/>
-            <a:chExt cx="4418904" cy="3762375"/>
-          </a:xfrm>
-        </p:grpSpPr>
-        <p:grpSp>
-          <p:nvGrpSpPr>
-            <p:cNvPr id="8" name="그룹 7">
-              <a:extLst>
-                <a:ext uri="{FF2B5EF4-FFF2-40B4-BE49-F238E27FC236}">
-                  <a16:creationId xmlns:a16="http://schemas.microsoft.com/office/drawing/2014/main" id="{904F0F11-DB9B-40C7-A695-81E0F44FF15A}"/>
-                </a:ext>
-              </a:extLst>
-            </p:cNvPr>
-            <p:cNvGrpSpPr/>
-            <p:nvPr/>
-          </p:nvGrpSpPr>
-          <p:grpSpPr>
-            <a:xfrm>
-              <a:off x="3910012" y="2717182"/>
-              <a:ext cx="4371975" cy="3762375"/>
-              <a:chOff x="594804" y="1547812"/>
-              <a:chExt cx="4371975" cy="3762375"/>
-            </a:xfrm>
-          </p:grpSpPr>
-          <p:pic>
-            <p:nvPicPr>
-              <p:cNvPr id="3" name="그림 2">
-                <a:extLst>
-                  <a:ext uri="{FF2B5EF4-FFF2-40B4-BE49-F238E27FC236}">
-                    <a16:creationId xmlns:a16="http://schemas.microsoft.com/office/drawing/2014/main" id="{BE1E555A-C630-444F-A274-CECD33C16C9F}"/>
-                  </a:ext>
-                </a:extLst>
-              </p:cNvPr>
-              <p:cNvPicPr>
-                <a:picLocks noChangeAspect="1"/>
-              </p:cNvPicPr>
-              <p:nvPr/>
-            </p:nvPicPr>
-            <p:blipFill>
-              <a:blip r:embed="rId3"/>
-              <a:stretch>
-                <a:fillRect/>
-              </a:stretch>
-            </p:blipFill>
-            <p:spPr>
-              <a:xfrm>
-                <a:off x="594804" y="1547812"/>
-                <a:ext cx="4371975" cy="3762375"/>
-              </a:xfrm>
-              <a:prstGeom prst="rect">
-                <a:avLst/>
-              </a:prstGeom>
-            </p:spPr>
-          </p:pic>
-          <p:sp>
-            <p:nvSpPr>
-              <p:cNvPr id="5" name="직사각형 4">
-                <a:extLst>
-                  <a:ext uri="{FF2B5EF4-FFF2-40B4-BE49-F238E27FC236}">
-                    <a16:creationId xmlns:a16="http://schemas.microsoft.com/office/drawing/2014/main" id="{D78AF34A-0D3F-4657-B354-822ED02D7CE0}"/>
-                  </a:ext>
-                </a:extLst>
-              </p:cNvPr>
-              <p:cNvSpPr/>
-              <p:nvPr/>
-            </p:nvSpPr>
-            <p:spPr>
-              <a:xfrm>
-                <a:off x="747721" y="2229371"/>
-                <a:ext cx="2377219" cy="957712"/>
-              </a:xfrm>
-              <a:prstGeom prst="rect">
-                <a:avLst/>
-              </a:prstGeom>
-              <a:noFill/>
-              <a:ln w="57150">
-                <a:solidFill>
-                  <a:srgbClr val="FF0000"/>
-                </a:solidFill>
-              </a:ln>
-            </p:spPr>
-            <p:style>
-              <a:lnRef idx="2">
-                <a:schemeClr val="accent1">
-                  <a:shade val="50000"/>
-                </a:schemeClr>
-              </a:lnRef>
-              <a:fillRef idx="1">
-                <a:schemeClr val="accent1"/>
-              </a:fillRef>
-              <a:effectRef idx="0">
-                <a:schemeClr val="accent1"/>
-              </a:effectRef>
-              <a:fontRef idx="minor">
-                <a:schemeClr val="lt1"/>
-              </a:fontRef>
-            </p:style>
-            <p:txBody>
-              <a:bodyPr rtlCol="0" anchor="ctr"/>
-              <a:lstStyle/>
-              <a:p>
-                <a:pPr algn="ctr"/>
-                <a:endParaRPr lang="ko-KR" altLang="en-US"/>
-              </a:p>
-            </p:txBody>
-          </p:sp>
-          <p:sp>
-            <p:nvSpPr>
-              <p:cNvPr id="6" name="직사각형 5">
-                <a:extLst>
-                  <a:ext uri="{FF2B5EF4-FFF2-40B4-BE49-F238E27FC236}">
-                    <a16:creationId xmlns:a16="http://schemas.microsoft.com/office/drawing/2014/main" id="{D4B3F4AA-0E46-4B5F-9A4C-2FACD1D7784F}"/>
-                  </a:ext>
-                </a:extLst>
-              </p:cNvPr>
-              <p:cNvSpPr/>
-              <p:nvPr/>
-            </p:nvSpPr>
-            <p:spPr>
-              <a:xfrm>
-                <a:off x="747722" y="4246081"/>
-                <a:ext cx="2084256" cy="521228"/>
-              </a:xfrm>
-              <a:prstGeom prst="rect">
-                <a:avLst/>
-              </a:prstGeom>
-              <a:noFill/>
-              <a:ln w="57150">
-                <a:solidFill>
-                  <a:srgbClr val="FF0000"/>
-                </a:solidFill>
-              </a:ln>
-            </p:spPr>
-            <p:style>
-              <a:lnRef idx="2">
-                <a:schemeClr val="accent1">
-                  <a:shade val="50000"/>
-                </a:schemeClr>
-              </a:lnRef>
-              <a:fillRef idx="1">
-                <a:schemeClr val="accent1"/>
-              </a:fillRef>
-              <a:effectRef idx="0">
-                <a:schemeClr val="accent1"/>
-              </a:effectRef>
-              <a:fontRef idx="minor">
-                <a:schemeClr val="lt1"/>
-              </a:fontRef>
-            </p:style>
-            <p:txBody>
-              <a:bodyPr rtlCol="0" anchor="ctr"/>
-              <a:lstStyle/>
-              <a:p>
-                <a:pPr algn="ctr"/>
-                <a:endParaRPr lang="ko-KR" altLang="en-US"/>
-              </a:p>
-            </p:txBody>
-          </p:sp>
-          <p:sp>
-            <p:nvSpPr>
-              <p:cNvPr id="7" name="직사각형 6">
-                <a:extLst>
-                  <a:ext uri="{FF2B5EF4-FFF2-40B4-BE49-F238E27FC236}">
-                    <a16:creationId xmlns:a16="http://schemas.microsoft.com/office/drawing/2014/main" id="{3F3856C9-A684-4ACB-B060-84DB5D7AB4D0}"/>
-                  </a:ext>
-                </a:extLst>
-              </p:cNvPr>
-              <p:cNvSpPr/>
-              <p:nvPr/>
-            </p:nvSpPr>
-            <p:spPr>
-              <a:xfrm>
-                <a:off x="747721" y="3318910"/>
-                <a:ext cx="4219058" cy="768585"/>
-              </a:xfrm>
-              <a:prstGeom prst="rect">
-                <a:avLst/>
-              </a:prstGeom>
-              <a:noFill/>
-              <a:ln w="57150">
-                <a:solidFill>
-                  <a:srgbClr val="FF0000"/>
-                </a:solidFill>
-              </a:ln>
-            </p:spPr>
-            <p:style>
-              <a:lnRef idx="2">
-                <a:schemeClr val="accent1">
-                  <a:shade val="50000"/>
-                </a:schemeClr>
-              </a:lnRef>
-              <a:fillRef idx="1">
-                <a:schemeClr val="accent1"/>
-              </a:fillRef>
-              <a:effectRef idx="0">
-                <a:schemeClr val="accent1"/>
-              </a:effectRef>
-              <a:fontRef idx="minor">
-                <a:schemeClr val="lt1"/>
-              </a:fontRef>
-            </p:style>
-            <p:txBody>
-              <a:bodyPr rtlCol="0" anchor="ctr"/>
-              <a:lstStyle/>
-              <a:p>
-                <a:pPr algn="ctr"/>
-                <a:endParaRPr lang="ko-KR" altLang="en-US"/>
-              </a:p>
-            </p:txBody>
-          </p:sp>
-        </p:grpSp>
-        <p:sp>
-          <p:nvSpPr>
-            <p:cNvPr id="9" name="TextBox 8">
-              <a:extLst>
-                <a:ext uri="{FF2B5EF4-FFF2-40B4-BE49-F238E27FC236}">
-                  <a16:creationId xmlns:a16="http://schemas.microsoft.com/office/drawing/2014/main" id="{50864D92-6E7E-4CF1-B700-6C83BBEBFC27}"/>
-                </a:ext>
-              </a:extLst>
-            </p:cNvPr>
-            <p:cNvSpPr txBox="1"/>
-            <p:nvPr/>
-          </p:nvSpPr>
-          <p:spPr>
-            <a:xfrm>
-              <a:off x="6287973" y="5283435"/>
-              <a:ext cx="2040943" cy="584775"/>
-            </a:xfrm>
-            <a:prstGeom prst="rect">
-              <a:avLst/>
-            </a:prstGeom>
-            <a:noFill/>
-          </p:spPr>
-          <p:txBody>
-            <a:bodyPr wrap="none" rtlCol="0">
-              <a:spAutoFit/>
-            </a:bodyPr>
-            <a:lstStyle/>
-            <a:p>
-              <a:pPr algn="ctr"/>
-              <a:r>
-                <a:rPr lang="en-US" altLang="ko-KR" sz="1600" b="1" dirty="0">
-                  <a:solidFill>
-                    <a:srgbClr val="FF0000"/>
-                  </a:solidFill>
-                </a:rPr>
-                <a:t>100%</a:t>
-              </a:r>
-              <a:r>
-                <a:rPr lang="ko-KR" altLang="en-US" sz="1600" b="1" dirty="0">
-                  <a:solidFill>
-                    <a:srgbClr val="FF0000"/>
-                  </a:solidFill>
-                </a:rPr>
-                <a:t>로 따졌을 때</a:t>
-              </a:r>
-              <a:r>
-                <a:rPr lang="en-US" altLang="ko-KR" sz="1600" b="1" dirty="0">
-                  <a:solidFill>
-                    <a:srgbClr val="FF0000"/>
-                  </a:solidFill>
-                </a:rPr>
-                <a:t>,</a:t>
-              </a:r>
-              <a:br>
-                <a:rPr lang="en-US" altLang="ko-KR" sz="1600" b="1" dirty="0">
-                  <a:solidFill>
-                    <a:srgbClr val="FF0000"/>
-                  </a:solidFill>
-                </a:rPr>
-              </a:br>
-              <a:r>
-                <a:rPr lang="en-US" altLang="ko-KR" sz="1600" b="1" dirty="0">
-                  <a:solidFill>
-                    <a:srgbClr val="FF0000"/>
-                  </a:solidFill>
-                </a:rPr>
-                <a:t>-5</a:t>
-              </a:r>
-              <a:r>
-                <a:rPr lang="ko-KR" altLang="en-US" sz="1600" b="1" dirty="0">
-                  <a:solidFill>
-                    <a:srgbClr val="FF0000"/>
-                  </a:solidFill>
-                </a:rPr>
-                <a:t>만큼 남기고 이동</a:t>
-              </a:r>
-              <a:endParaRPr lang="en-US" altLang="ko-KR" sz="1600" b="1" dirty="0">
-                <a:solidFill>
-                  <a:srgbClr val="FF0000"/>
-                </a:solidFill>
-              </a:endParaRPr>
-            </a:p>
-          </p:txBody>
-        </p:sp>
-      </p:grpSp>
-      <p:sp>
-        <p:nvSpPr>
-          <p:cNvPr id="10" name="직사각형 9">
-            <a:extLst>
-              <a:ext uri="{FF2B5EF4-FFF2-40B4-BE49-F238E27FC236}">
-                <a16:creationId xmlns:a16="http://schemas.microsoft.com/office/drawing/2014/main" id="{0B37AB16-0B2F-4A47-911E-4301F91C2BA0}"/>
-              </a:ext>
-            </a:extLst>
-          </p:cNvPr>
-          <p:cNvSpPr/>
-          <p:nvPr/>
-        </p:nvSpPr>
-        <p:spPr>
-          <a:xfrm>
-            <a:off x="8478175" y="3755254"/>
-            <a:ext cx="3275860" cy="2041864"/>
-          </a:xfrm>
-          <a:prstGeom prst="rect">
-            <a:avLst/>
-          </a:prstGeom>
-          <a:noFill/>
-          <a:ln w="57150"/>
-        </p:spPr>
-        <p:style>
-          <a:lnRef idx="2">
-            <a:schemeClr val="accent1">
-              <a:shade val="50000"/>
-            </a:schemeClr>
-          </a:lnRef>
-          <a:fillRef idx="1">
-            <a:schemeClr val="accent1"/>
-          </a:fillRef>
-          <a:effectRef idx="0">
-            <a:schemeClr val="accent1"/>
-          </a:effectRef>
-          <a:fontRef idx="minor">
-            <a:schemeClr val="lt1"/>
-          </a:fontRef>
-        </p:style>
-        <p:txBody>
-          <a:bodyPr rtlCol="0" anchor="ctr"/>
-          <a:lstStyle/>
-          <a:p>
-            <a:pPr algn="ctr"/>
-            <a:endParaRPr lang="ko-KR" altLang="en-US"/>
-          </a:p>
-        </p:txBody>
-      </p:sp>
-      <p:cxnSp>
-        <p:nvCxnSpPr>
-          <p:cNvPr id="12" name="직선 화살표 연결선 11">
-            <a:extLst>
-              <a:ext uri="{FF2B5EF4-FFF2-40B4-BE49-F238E27FC236}">
-                <a16:creationId xmlns:a16="http://schemas.microsoft.com/office/drawing/2014/main" id="{7A74F049-3026-49B8-81FF-016FA9A098A5}"/>
-              </a:ext>
-            </a:extLst>
-          </p:cNvPr>
-          <p:cNvCxnSpPr/>
-          <p:nvPr/>
-        </p:nvCxnSpPr>
-        <p:spPr>
-          <a:xfrm>
-            <a:off x="8993080" y="3825180"/>
-            <a:ext cx="0" cy="1900917"/>
-          </a:xfrm>
-          <a:prstGeom prst="straightConnector1">
-            <a:avLst/>
-          </a:prstGeom>
-          <a:ln w="57150">
-            <a:solidFill>
-              <a:srgbClr val="92D050"/>
-            </a:solidFill>
-            <a:headEnd type="triangle"/>
-            <a:tailEnd type="triangle"/>
-          </a:ln>
-        </p:spPr>
-        <p:style>
-          <a:lnRef idx="1">
-            <a:schemeClr val="accent1"/>
-          </a:lnRef>
-          <a:fillRef idx="0">
-            <a:schemeClr val="accent1"/>
-          </a:fillRef>
-          <a:effectRef idx="0">
-            <a:schemeClr val="accent1"/>
-          </a:effectRef>
-          <a:fontRef idx="minor">
-            <a:schemeClr val="tx1"/>
-          </a:fontRef>
-        </p:style>
-      </p:cxnSp>
-      <p:sp>
-        <p:nvSpPr>
-          <p:cNvPr id="13" name="TextBox 12">
-            <a:extLst>
-              <a:ext uri="{FF2B5EF4-FFF2-40B4-BE49-F238E27FC236}">
-                <a16:creationId xmlns:a16="http://schemas.microsoft.com/office/drawing/2014/main" id="{44FA9267-6858-4A94-94DE-1AA4105E9040}"/>
-              </a:ext>
-            </a:extLst>
-          </p:cNvPr>
-          <p:cNvSpPr txBox="1"/>
-          <p:nvPr/>
-        </p:nvSpPr>
-        <p:spPr>
-          <a:xfrm>
-            <a:off x="8997519" y="3877597"/>
-            <a:ext cx="720069" cy="338554"/>
-          </a:xfrm>
-          <a:prstGeom prst="rect">
-            <a:avLst/>
-          </a:prstGeom>
-          <a:noFill/>
-        </p:spPr>
-        <p:txBody>
-          <a:bodyPr wrap="none" rtlCol="0">
-            <a:spAutoFit/>
-          </a:bodyPr>
-          <a:lstStyle/>
-          <a:p>
-            <a:pPr algn="ctr"/>
-            <a:r>
-              <a:rPr lang="en-US" altLang="ko-KR" sz="1600" b="1" dirty="0">
-                <a:solidFill>
-                  <a:srgbClr val="92D050"/>
-                </a:solidFill>
-              </a:rPr>
-              <a:t>100%</a:t>
-            </a:r>
-          </a:p>
-        </p:txBody>
-      </p:sp>
-      <p:cxnSp>
-        <p:nvCxnSpPr>
-          <p:cNvPr id="15" name="직선 화살표 연결선 14">
-            <a:extLst>
-              <a:ext uri="{FF2B5EF4-FFF2-40B4-BE49-F238E27FC236}">
-                <a16:creationId xmlns:a16="http://schemas.microsoft.com/office/drawing/2014/main" id="{7AEB1044-10F4-4DAA-B2CD-ACAE347488F0}"/>
-              </a:ext>
-            </a:extLst>
-          </p:cNvPr>
-          <p:cNvCxnSpPr/>
-          <p:nvPr/>
-        </p:nvCxnSpPr>
-        <p:spPr>
-          <a:xfrm>
-            <a:off x="10404629" y="3825180"/>
-            <a:ext cx="0" cy="390971"/>
-          </a:xfrm>
-          <a:prstGeom prst="straightConnector1">
-            <a:avLst/>
-          </a:prstGeom>
-          <a:ln w="38100">
-            <a:solidFill>
-              <a:srgbClr val="FFC000"/>
-            </a:solidFill>
-            <a:headEnd type="triangle"/>
-            <a:tailEnd type="triangle"/>
-          </a:ln>
-        </p:spPr>
-        <p:style>
-          <a:lnRef idx="1">
-            <a:schemeClr val="accent1"/>
-          </a:lnRef>
-          <a:fillRef idx="0">
-            <a:schemeClr val="accent1"/>
-          </a:fillRef>
-          <a:effectRef idx="0">
-            <a:schemeClr val="accent1"/>
-          </a:effectRef>
-          <a:fontRef idx="minor">
-            <a:schemeClr val="tx1"/>
-          </a:fontRef>
-        </p:style>
-      </p:cxnSp>
-      <p:sp>
-        <p:nvSpPr>
-          <p:cNvPr id="16" name="TextBox 15">
-            <a:extLst>
-              <a:ext uri="{FF2B5EF4-FFF2-40B4-BE49-F238E27FC236}">
-                <a16:creationId xmlns:a16="http://schemas.microsoft.com/office/drawing/2014/main" id="{5F4CB275-B3DB-40BB-9625-C76220A771A2}"/>
-              </a:ext>
-            </a:extLst>
-          </p:cNvPr>
-          <p:cNvSpPr txBox="1"/>
-          <p:nvPr/>
-        </p:nvSpPr>
-        <p:spPr>
-          <a:xfrm>
-            <a:off x="10418922" y="3851388"/>
-            <a:ext cx="622991" cy="338554"/>
-          </a:xfrm>
-          <a:prstGeom prst="rect">
-            <a:avLst/>
-          </a:prstGeom>
-          <a:noFill/>
-        </p:spPr>
-        <p:txBody>
-          <a:bodyPr wrap="none" rtlCol="0">
-            <a:spAutoFit/>
-          </a:bodyPr>
-          <a:lstStyle/>
-          <a:p>
-            <a:pPr algn="ctr"/>
-            <a:r>
-              <a:rPr lang="en-US" altLang="ko-KR" sz="1600" b="1" dirty="0">
-                <a:solidFill>
-                  <a:srgbClr val="FFC000"/>
-                </a:solidFill>
-              </a:rPr>
-              <a:t>-5px</a:t>
-            </a:r>
-          </a:p>
-        </p:txBody>
-      </p:sp>
-      <p:sp>
-        <p:nvSpPr>
-          <p:cNvPr id="17" name="직사각형 16">
-            <a:extLst>
-              <a:ext uri="{FF2B5EF4-FFF2-40B4-BE49-F238E27FC236}">
-                <a16:creationId xmlns:a16="http://schemas.microsoft.com/office/drawing/2014/main" id="{4F6E655E-07A7-4B6E-8557-CB4470DB6D53}"/>
-              </a:ext>
-            </a:extLst>
-          </p:cNvPr>
-          <p:cNvSpPr/>
-          <p:nvPr/>
-        </p:nvSpPr>
-        <p:spPr>
-          <a:xfrm>
-            <a:off x="214015" y="889793"/>
-            <a:ext cx="3590925" cy="841353"/>
-          </a:xfrm>
-          <a:prstGeom prst="rect">
-            <a:avLst/>
-          </a:prstGeom>
-          <a:noFill/>
-          <a:ln w="57150">
-            <a:solidFill>
-              <a:srgbClr val="FF0000"/>
-            </a:solidFill>
-          </a:ln>
-        </p:spPr>
-        <p:style>
-          <a:lnRef idx="2">
-            <a:schemeClr val="accent1">
-              <a:shade val="50000"/>
-            </a:schemeClr>
-          </a:lnRef>
-          <a:fillRef idx="1">
-            <a:schemeClr val="accent1"/>
-          </a:fillRef>
-          <a:effectRef idx="0">
-            <a:schemeClr val="accent1"/>
-          </a:effectRef>
-          <a:fontRef idx="minor">
-            <a:schemeClr val="lt1"/>
-          </a:fontRef>
-        </p:style>
-        <p:txBody>
-          <a:bodyPr rtlCol="0" anchor="ctr"/>
-          <a:lstStyle/>
-          <a:p>
-            <a:pPr algn="ctr"/>
-            <a:endParaRPr lang="ko-KR" altLang="en-US"/>
-          </a:p>
-        </p:txBody>
-      </p:sp>
-      <p:sp>
-        <p:nvSpPr>
-          <p:cNvPr id="18" name="TextBox 17">
-            <a:extLst>
-              <a:ext uri="{FF2B5EF4-FFF2-40B4-BE49-F238E27FC236}">
-                <a16:creationId xmlns:a16="http://schemas.microsoft.com/office/drawing/2014/main" id="{EBB2473F-20D5-4174-A87F-01D03640822D}"/>
-              </a:ext>
-            </a:extLst>
-          </p:cNvPr>
-          <p:cNvSpPr txBox="1"/>
-          <p:nvPr/>
-        </p:nvSpPr>
-        <p:spPr>
-          <a:xfrm>
-            <a:off x="8120589" y="5867044"/>
-            <a:ext cx="4178452" cy="338554"/>
-          </a:xfrm>
-          <a:prstGeom prst="rect">
-            <a:avLst/>
-          </a:prstGeom>
-          <a:noFill/>
-        </p:spPr>
-        <p:txBody>
-          <a:bodyPr wrap="none" rtlCol="0">
-            <a:spAutoFit/>
-          </a:bodyPr>
-          <a:lstStyle/>
-          <a:p>
-            <a:pPr algn="ctr"/>
-            <a:r>
-              <a:rPr lang="en-US" altLang="ko-KR" sz="1600" b="1" dirty="0">
-                <a:solidFill>
-                  <a:srgbClr val="92D050"/>
-                </a:solidFill>
-              </a:rPr>
-              <a:t>-5px</a:t>
-            </a:r>
-            <a:r>
-              <a:rPr lang="ko-KR" altLang="en-US" sz="1600" b="1" dirty="0">
-                <a:solidFill>
-                  <a:srgbClr val="92D050"/>
-                </a:solidFill>
-              </a:rPr>
-              <a:t> 만큼을 제외한 </a:t>
-            </a:r>
-            <a:r>
-              <a:rPr lang="en-US" altLang="ko-KR" sz="1600" b="1" dirty="0">
-                <a:solidFill>
-                  <a:srgbClr val="92D050"/>
-                </a:solidFill>
-              </a:rPr>
-              <a:t>100%</a:t>
-            </a:r>
-            <a:r>
-              <a:rPr lang="ko-KR" altLang="en-US" sz="1600" b="1" dirty="0">
-                <a:solidFill>
-                  <a:srgbClr val="92D050"/>
-                </a:solidFill>
-              </a:rPr>
-              <a:t>를 </a:t>
-            </a:r>
-            <a:r>
-              <a:rPr lang="en-US" altLang="ko-KR" sz="1600" b="1" dirty="0">
-                <a:solidFill>
-                  <a:srgbClr val="92D050"/>
-                </a:solidFill>
-              </a:rPr>
-              <a:t>Y</a:t>
-            </a:r>
-            <a:r>
-              <a:rPr lang="ko-KR" altLang="en-US" sz="1600" b="1" dirty="0">
-                <a:solidFill>
-                  <a:srgbClr val="92D050"/>
-                </a:solidFill>
-              </a:rPr>
-              <a:t>축으로 이동</a:t>
-            </a:r>
-            <a:endParaRPr lang="en-US" altLang="ko-KR" sz="1600" b="1" dirty="0">
-              <a:solidFill>
-                <a:srgbClr val="92D050"/>
-              </a:solidFill>
-            </a:endParaRPr>
-          </a:p>
-        </p:txBody>
-      </p:sp>
-      <p:sp>
-        <p:nvSpPr>
-          <p:cNvPr id="20" name="TextBox 19">
-            <a:extLst>
-              <a:ext uri="{FF2B5EF4-FFF2-40B4-BE49-F238E27FC236}">
-                <a16:creationId xmlns:a16="http://schemas.microsoft.com/office/drawing/2014/main" id="{ED6E25F1-88BC-4371-BA0D-802786FF015F}"/>
-              </a:ext>
-            </a:extLst>
-          </p:cNvPr>
-          <p:cNvSpPr txBox="1"/>
-          <p:nvPr/>
-        </p:nvSpPr>
-        <p:spPr>
-          <a:xfrm>
-            <a:off x="4038040" y="838594"/>
-            <a:ext cx="2379306" cy="892552"/>
-          </a:xfrm>
-          <a:prstGeom prst="rect">
-            <a:avLst/>
-          </a:prstGeom>
-          <a:noFill/>
-        </p:spPr>
-        <p:txBody>
-          <a:bodyPr wrap="none" rtlCol="0">
-            <a:spAutoFit/>
-          </a:bodyPr>
-          <a:lstStyle/>
-          <a:p>
-            <a:pPr algn="ctr"/>
-            <a:r>
-              <a:rPr lang="en-US" altLang="ko-KR" sz="2000" b="1" dirty="0"/>
-              <a:t>Translate Y</a:t>
-            </a:r>
-            <a:r>
-              <a:rPr lang="ko-KR" altLang="en-US" sz="2000" b="1" dirty="0"/>
-              <a:t>축 이동</a:t>
-            </a:r>
-            <a:endParaRPr lang="en-US" altLang="ko-KR" sz="1600" b="1" dirty="0"/>
-          </a:p>
-          <a:p>
-            <a:pPr algn="ctr"/>
-            <a:r>
-              <a:rPr lang="en-US" altLang="ko-KR" sz="1600" b="1" dirty="0"/>
-              <a:t>Bottom</a:t>
-            </a:r>
-            <a:r>
-              <a:rPr lang="ko-KR" altLang="en-US" sz="1600" b="1" dirty="0"/>
-              <a:t> </a:t>
-            </a:r>
-            <a:r>
-              <a:rPr lang="en-US" altLang="ko-KR" sz="1600" b="1" dirty="0"/>
-              <a:t>-&gt; Top : -</a:t>
-            </a:r>
-          </a:p>
-          <a:p>
-            <a:pPr algn="ctr"/>
-            <a:r>
-              <a:rPr lang="en-US" altLang="ko-KR" sz="1600" b="1" dirty="0"/>
-              <a:t>Top -&gt; Bottom : +</a:t>
-            </a:r>
-          </a:p>
-        </p:txBody>
-      </p:sp>
-    </p:spTree>
-    <p:extLst>
-      <p:ext uri="{BB962C8B-B14F-4D97-AF65-F5344CB8AC3E}">
-        <p14:creationId xmlns:p14="http://schemas.microsoft.com/office/powerpoint/2010/main" val="3498254614"/>
-      </p:ext>
-    </p:extLst>
-  </p:cSld>
-  <p:clrMapOvr>
-    <a:masterClrMapping/>
-  </p:clrMapOvr>
-</p:sld>
-</file>
-
-<file path=ppt/slides/slide3.xml><?xml version="1.0" encoding="utf-8"?>
-<p:sld xmlns:a="http://schemas.openxmlformats.org/drawingml/2006/main" xmlns:r="http://schemas.openxmlformats.org/officeDocument/2006/relationships" xmlns:p="http://schemas.openxmlformats.org/presentationml/2006/main">
-  <p:cSld>
-    <p:spTree>
-      <p:nvGrpSpPr>
-        <p:cNvPr id="1" name=""/>
-        <p:cNvGrpSpPr/>
-        <p:nvPr/>
-      </p:nvGrpSpPr>
-      <p:grpSpPr>
-        <a:xfrm>
-          <a:off x="0" y="0"/>
-          <a:ext cx="0" cy="0"/>
-          <a:chOff x="0" y="0"/>
-          <a:chExt cx="0" cy="0"/>
-        </a:xfrm>
-      </p:grpSpPr>
-      <p:pic>
-        <p:nvPicPr>
-          <p:cNvPr id="27" name="그림 26">
-            <a:extLst>
-              <a:ext uri="{FF2B5EF4-FFF2-40B4-BE49-F238E27FC236}">
-                <a16:creationId xmlns:a16="http://schemas.microsoft.com/office/drawing/2014/main" id="{489B847C-1E71-45DE-A5D2-49374CF2EDF9}"/>
-              </a:ext>
-            </a:extLst>
-          </p:cNvPr>
-          <p:cNvPicPr>
-            <a:picLocks noChangeAspect="1"/>
-          </p:cNvPicPr>
-          <p:nvPr/>
-        </p:nvPicPr>
-        <p:blipFill>
-          <a:blip r:embed="rId3"/>
-          <a:stretch>
-            <a:fillRect/>
-          </a:stretch>
-        </p:blipFill>
-        <p:spPr>
-          <a:xfrm>
-            <a:off x="411319" y="775191"/>
-            <a:ext cx="3813810" cy="5553075"/>
-          </a:xfrm>
-          <a:prstGeom prst="rect">
-            <a:avLst/>
-          </a:prstGeom>
-        </p:spPr>
-      </p:pic>
-      <p:sp>
-        <p:nvSpPr>
-          <p:cNvPr id="3" name="TextBox 2">
-            <a:extLst>
-              <a:ext uri="{FF2B5EF4-FFF2-40B4-BE49-F238E27FC236}">
-                <a16:creationId xmlns:a16="http://schemas.microsoft.com/office/drawing/2014/main" id="{398A116F-2E88-4E9E-9350-FB96A4B28C49}"/>
-              </a:ext>
-            </a:extLst>
-          </p:cNvPr>
-          <p:cNvSpPr txBox="1"/>
-          <p:nvPr/>
-        </p:nvSpPr>
-        <p:spPr>
-          <a:xfrm>
-            <a:off x="372862" y="328474"/>
-            <a:ext cx="1712969" cy="400110"/>
-          </a:xfrm>
-          <a:prstGeom prst="rect">
-            <a:avLst/>
-          </a:prstGeom>
-          <a:noFill/>
-        </p:spPr>
-        <p:txBody>
-          <a:bodyPr wrap="none" rtlCol="0">
-            <a:spAutoFit/>
-          </a:bodyPr>
-          <a:lstStyle/>
-          <a:p>
-            <a:r>
-              <a:rPr lang="en-US" altLang="ko-KR" sz="2000" b="1" dirty="0"/>
-              <a:t>Confirm CSS</a:t>
-            </a:r>
-            <a:endParaRPr lang="ko-KR" altLang="en-US" sz="2000" b="1" dirty="0"/>
-          </a:p>
-        </p:txBody>
-      </p:sp>
-      <p:sp>
-        <p:nvSpPr>
-          <p:cNvPr id="4" name="직사각형 3">
-            <a:extLst>
-              <a:ext uri="{FF2B5EF4-FFF2-40B4-BE49-F238E27FC236}">
-                <a16:creationId xmlns:a16="http://schemas.microsoft.com/office/drawing/2014/main" id="{1341A1E1-4270-4951-A0FB-DBEC7C47B250}"/>
-              </a:ext>
-            </a:extLst>
-          </p:cNvPr>
-          <p:cNvSpPr/>
-          <p:nvPr/>
-        </p:nvSpPr>
-        <p:spPr>
-          <a:xfrm>
-            <a:off x="645023" y="1241467"/>
-            <a:ext cx="2377219" cy="957712"/>
-          </a:xfrm>
-          <a:prstGeom prst="rect">
-            <a:avLst/>
-          </a:prstGeom>
-          <a:noFill/>
-          <a:ln w="57150">
-            <a:solidFill>
-              <a:srgbClr val="FF0000"/>
-            </a:solidFill>
-          </a:ln>
-        </p:spPr>
-        <p:style>
-          <a:lnRef idx="2">
-            <a:schemeClr val="accent1">
-              <a:shade val="50000"/>
-            </a:schemeClr>
-          </a:lnRef>
-          <a:fillRef idx="1">
-            <a:schemeClr val="accent1"/>
-          </a:fillRef>
-          <a:effectRef idx="0">
-            <a:schemeClr val="accent1"/>
-          </a:effectRef>
-          <a:fontRef idx="minor">
-            <a:schemeClr val="lt1"/>
-          </a:fontRef>
-        </p:style>
-        <p:txBody>
-          <a:bodyPr rtlCol="0" anchor="ctr"/>
-          <a:lstStyle/>
-          <a:p>
-            <a:pPr algn="ctr"/>
-            <a:endParaRPr lang="ko-KR" altLang="en-US"/>
-          </a:p>
-        </p:txBody>
-      </p:sp>
-      <p:sp>
-        <p:nvSpPr>
-          <p:cNvPr id="7" name="TextBox 6">
-            <a:extLst>
-              <a:ext uri="{FF2B5EF4-FFF2-40B4-BE49-F238E27FC236}">
-                <a16:creationId xmlns:a16="http://schemas.microsoft.com/office/drawing/2014/main" id="{17382ED9-933B-44EC-85A9-1B7B4ACFC336}"/>
-              </a:ext>
-            </a:extLst>
-          </p:cNvPr>
-          <p:cNvSpPr txBox="1"/>
-          <p:nvPr/>
-        </p:nvSpPr>
-        <p:spPr>
-          <a:xfrm>
-            <a:off x="5415377" y="856628"/>
-            <a:ext cx="2554481" cy="307777"/>
-          </a:xfrm>
-          <a:prstGeom prst="rect">
-            <a:avLst/>
-          </a:prstGeom>
-          <a:noFill/>
-        </p:spPr>
-        <p:txBody>
-          <a:bodyPr wrap="none" rtlCol="0">
-            <a:spAutoFit/>
-          </a:bodyPr>
-          <a:lstStyle/>
-          <a:p>
-            <a:pPr algn="ctr"/>
-            <a:r>
-              <a:rPr lang="en-US" altLang="ko-KR" sz="1400" b="1" dirty="0" err="1">
-                <a:solidFill>
-                  <a:srgbClr val="00B0F0"/>
-                </a:solidFill>
-              </a:rPr>
-              <a:t>Div</a:t>
-            </a:r>
-            <a:r>
-              <a:rPr lang="en-US" altLang="ko-KR" sz="1400" b="1" dirty="0">
-                <a:solidFill>
-                  <a:srgbClr val="00B0F0"/>
-                </a:solidFill>
-              </a:rPr>
-              <a:t> progress : flex</a:t>
-            </a:r>
-            <a:r>
-              <a:rPr lang="ko-KR" altLang="en-US" sz="1400" b="1" dirty="0">
-                <a:solidFill>
-                  <a:srgbClr val="00B0F0"/>
-                </a:solidFill>
-              </a:rPr>
-              <a:t> 영역 </a:t>
-            </a:r>
-            <a:r>
-              <a:rPr lang="en-US" altLang="ko-KR" sz="1400" b="1" dirty="0">
-                <a:solidFill>
-                  <a:srgbClr val="00B0F0"/>
-                </a:solidFill>
-              </a:rPr>
-              <a:t>: 10</a:t>
-            </a:r>
-          </a:p>
-        </p:txBody>
-      </p:sp>
-      <p:sp>
-        <p:nvSpPr>
-          <p:cNvPr id="11" name="TextBox 10">
-            <a:extLst>
-              <a:ext uri="{FF2B5EF4-FFF2-40B4-BE49-F238E27FC236}">
-                <a16:creationId xmlns:a16="http://schemas.microsoft.com/office/drawing/2014/main" id="{2FC620F4-3D62-4DA6-A8D1-5840CC5C51EE}"/>
-              </a:ext>
-            </a:extLst>
-          </p:cNvPr>
-          <p:cNvSpPr txBox="1"/>
-          <p:nvPr/>
-        </p:nvSpPr>
-        <p:spPr>
-          <a:xfrm>
-            <a:off x="5415377" y="4057567"/>
-            <a:ext cx="6312562" cy="369332"/>
-          </a:xfrm>
-          <a:prstGeom prst="rect">
-            <a:avLst/>
-          </a:prstGeom>
-          <a:noFill/>
-        </p:spPr>
-        <p:txBody>
-          <a:bodyPr wrap="none" rtlCol="0">
-            <a:spAutoFit/>
-          </a:bodyPr>
-          <a:lstStyle/>
-          <a:p>
-            <a:r>
-              <a:rPr lang="en-US" altLang="ko-KR" b="1" dirty="0" err="1">
-                <a:solidFill>
-                  <a:srgbClr val="92D050"/>
-                </a:solidFill>
-              </a:rPr>
-              <a:t>Progress__filled</a:t>
-            </a:r>
-            <a:r>
-              <a:rPr lang="ko-KR" altLang="en-US" b="1" dirty="0">
-                <a:solidFill>
-                  <a:srgbClr val="92D050"/>
-                </a:solidFill>
-              </a:rPr>
-              <a:t>의 </a:t>
-            </a:r>
-            <a:r>
-              <a:rPr lang="en-US" altLang="ko-KR" b="1" dirty="0">
-                <a:solidFill>
-                  <a:srgbClr val="92D050"/>
-                </a:solidFill>
-              </a:rPr>
-              <a:t>basis 0% ~~~ Progress</a:t>
-            </a:r>
-            <a:r>
-              <a:rPr lang="ko-KR" altLang="en-US" b="1" dirty="0">
-                <a:solidFill>
-                  <a:srgbClr val="92D050"/>
-                </a:solidFill>
-              </a:rPr>
-              <a:t>의 </a:t>
-            </a:r>
-            <a:r>
-              <a:rPr lang="en-US" altLang="ko-KR" b="1" dirty="0">
-                <a:solidFill>
-                  <a:srgbClr val="92D050"/>
-                </a:solidFill>
-              </a:rPr>
-              <a:t>basis 100%</a:t>
-            </a:r>
-          </a:p>
-        </p:txBody>
-      </p:sp>
-      <p:cxnSp>
-        <p:nvCxnSpPr>
-          <p:cNvPr id="16" name="직선 화살표 연결선 15">
-            <a:extLst>
-              <a:ext uri="{FF2B5EF4-FFF2-40B4-BE49-F238E27FC236}">
-                <a16:creationId xmlns:a16="http://schemas.microsoft.com/office/drawing/2014/main" id="{9F45C9AB-FB8B-4419-B494-47D6606AEE23}"/>
-              </a:ext>
-            </a:extLst>
-          </p:cNvPr>
-          <p:cNvCxnSpPr>
-            <a:cxnSpLocks/>
-          </p:cNvCxnSpPr>
-          <p:nvPr/>
-        </p:nvCxnSpPr>
-        <p:spPr>
-          <a:xfrm>
-            <a:off x="1833632" y="1347193"/>
-            <a:ext cx="3456817" cy="0"/>
-          </a:xfrm>
-          <a:prstGeom prst="straightConnector1">
-            <a:avLst/>
-          </a:prstGeom>
-          <a:ln w="57150">
-            <a:solidFill>
-              <a:srgbClr val="FFC000"/>
-            </a:solidFill>
-            <a:tailEnd type="triangle"/>
-          </a:ln>
-        </p:spPr>
-        <p:style>
-          <a:lnRef idx="1">
-            <a:schemeClr val="accent1"/>
-          </a:lnRef>
-          <a:fillRef idx="0">
-            <a:schemeClr val="accent1"/>
-          </a:fillRef>
-          <a:effectRef idx="0">
-            <a:schemeClr val="accent1"/>
-          </a:effectRef>
-          <a:fontRef idx="minor">
-            <a:schemeClr val="tx1"/>
-          </a:fontRef>
-        </p:style>
-      </p:cxnSp>
-      <p:sp>
-        <p:nvSpPr>
-          <p:cNvPr id="20" name="직사각형 19">
-            <a:extLst>
-              <a:ext uri="{FF2B5EF4-FFF2-40B4-BE49-F238E27FC236}">
-                <a16:creationId xmlns:a16="http://schemas.microsoft.com/office/drawing/2014/main" id="{D85530FB-BD41-42BC-B09B-11998A9A6701}"/>
-              </a:ext>
-            </a:extLst>
-          </p:cNvPr>
-          <p:cNvSpPr/>
-          <p:nvPr/>
-        </p:nvSpPr>
-        <p:spPr>
-          <a:xfrm>
-            <a:off x="5521911" y="1241467"/>
-            <a:ext cx="5566299" cy="830991"/>
-          </a:xfrm>
-          <a:prstGeom prst="rect">
-            <a:avLst/>
-          </a:prstGeom>
-          <a:noFill/>
-          <a:ln w="38100"/>
-        </p:spPr>
-        <p:style>
-          <a:lnRef idx="2">
-            <a:schemeClr val="accent1">
-              <a:shade val="50000"/>
-            </a:schemeClr>
-          </a:lnRef>
-          <a:fillRef idx="1">
-            <a:schemeClr val="accent1"/>
-          </a:fillRef>
-          <a:effectRef idx="0">
-            <a:schemeClr val="accent1"/>
-          </a:effectRef>
-          <a:fontRef idx="minor">
-            <a:schemeClr val="lt1"/>
-          </a:fontRef>
-        </p:style>
-        <p:txBody>
-          <a:bodyPr rtlCol="0" anchor="ctr"/>
-          <a:lstStyle/>
-          <a:p>
-            <a:pPr algn="ctr"/>
-            <a:endParaRPr lang="ko-KR" altLang="en-US"/>
-          </a:p>
-        </p:txBody>
-      </p:sp>
-      <p:cxnSp>
-        <p:nvCxnSpPr>
-          <p:cNvPr id="22" name="직선 연결선 21">
-            <a:extLst>
-              <a:ext uri="{FF2B5EF4-FFF2-40B4-BE49-F238E27FC236}">
-                <a16:creationId xmlns:a16="http://schemas.microsoft.com/office/drawing/2014/main" id="{F8769996-929D-4756-BE61-E657813C990C}"/>
-              </a:ext>
-            </a:extLst>
-          </p:cNvPr>
-          <p:cNvCxnSpPr/>
-          <p:nvPr/>
-        </p:nvCxnSpPr>
-        <p:spPr>
-          <a:xfrm flipV="1">
-            <a:off x="5521911" y="1099168"/>
-            <a:ext cx="5566299" cy="28214"/>
-          </a:xfrm>
-          <a:prstGeom prst="line">
-            <a:avLst/>
-          </a:prstGeom>
-        </p:spPr>
-        <p:style>
-          <a:lnRef idx="1">
-            <a:schemeClr val="accent1"/>
-          </a:lnRef>
-          <a:fillRef idx="0">
-            <a:schemeClr val="accent1"/>
-          </a:fillRef>
-          <a:effectRef idx="0">
-            <a:schemeClr val="accent1"/>
-          </a:effectRef>
-          <a:fontRef idx="minor">
-            <a:schemeClr val="tx1"/>
-          </a:fontRef>
-        </p:style>
-      </p:cxnSp>
-      <p:sp>
-        <p:nvSpPr>
-          <p:cNvPr id="25" name="직사각형 24">
-            <a:extLst>
-              <a:ext uri="{FF2B5EF4-FFF2-40B4-BE49-F238E27FC236}">
-                <a16:creationId xmlns:a16="http://schemas.microsoft.com/office/drawing/2014/main" id="{C4844630-A79F-460A-9AD9-E4654CC3E4FB}"/>
-              </a:ext>
-            </a:extLst>
-          </p:cNvPr>
-          <p:cNvSpPr/>
-          <p:nvPr/>
-        </p:nvSpPr>
-        <p:spPr>
-          <a:xfrm>
-            <a:off x="5539667" y="1259223"/>
-            <a:ext cx="124286" cy="782641"/>
-          </a:xfrm>
-          <a:prstGeom prst="rect">
-            <a:avLst/>
-          </a:prstGeom>
-          <a:solidFill>
-            <a:srgbClr val="FFC000"/>
-          </a:solidFill>
-          <a:ln>
-            <a:solidFill>
-              <a:srgbClr val="FFC000"/>
-            </a:solidFill>
-          </a:ln>
-        </p:spPr>
-        <p:style>
-          <a:lnRef idx="2">
-            <a:schemeClr val="accent1">
-              <a:shade val="50000"/>
-            </a:schemeClr>
-          </a:lnRef>
-          <a:fillRef idx="1">
-            <a:schemeClr val="accent1"/>
-          </a:fillRef>
-          <a:effectRef idx="0">
-            <a:schemeClr val="accent1"/>
-          </a:effectRef>
-          <a:fontRef idx="minor">
-            <a:schemeClr val="lt1"/>
-          </a:fontRef>
-        </p:style>
-        <p:txBody>
-          <a:bodyPr rtlCol="0" anchor="ctr"/>
-          <a:lstStyle/>
-          <a:p>
-            <a:pPr algn="ctr"/>
-            <a:endParaRPr lang="ko-KR" altLang="en-US"/>
-          </a:p>
-        </p:txBody>
-      </p:sp>
-      <p:sp>
-        <p:nvSpPr>
-          <p:cNvPr id="26" name="TextBox 25">
-            <a:extLst>
-              <a:ext uri="{FF2B5EF4-FFF2-40B4-BE49-F238E27FC236}">
-                <a16:creationId xmlns:a16="http://schemas.microsoft.com/office/drawing/2014/main" id="{C985190B-19C1-4172-A5EB-C70524D61CA3}"/>
-              </a:ext>
-            </a:extLst>
-          </p:cNvPr>
-          <p:cNvSpPr txBox="1"/>
-          <p:nvPr/>
-        </p:nvSpPr>
-        <p:spPr>
-          <a:xfrm>
-            <a:off x="5415377" y="2179696"/>
-            <a:ext cx="3032177" cy="307777"/>
-          </a:xfrm>
-          <a:prstGeom prst="rect">
-            <a:avLst/>
-          </a:prstGeom>
-          <a:noFill/>
-        </p:spPr>
-        <p:txBody>
-          <a:bodyPr wrap="none" rtlCol="0">
-            <a:spAutoFit/>
-          </a:bodyPr>
-          <a:lstStyle/>
-          <a:p>
-            <a:r>
-              <a:rPr lang="en-US" altLang="ko-KR" sz="1400" b="1" dirty="0" err="1">
-                <a:solidFill>
-                  <a:srgbClr val="00B0F0"/>
-                </a:solidFill>
-              </a:rPr>
-              <a:t>Div</a:t>
-            </a:r>
-            <a:r>
-              <a:rPr lang="en-US" altLang="ko-KR" sz="1400" b="1" dirty="0">
-                <a:solidFill>
-                  <a:srgbClr val="00B0F0"/>
-                </a:solidFill>
-              </a:rPr>
-              <a:t> </a:t>
-            </a:r>
-            <a:r>
-              <a:rPr lang="en-US" altLang="ko-KR" sz="1400" b="1" dirty="0" err="1">
-                <a:solidFill>
-                  <a:srgbClr val="00B0F0"/>
-                </a:solidFill>
-              </a:rPr>
-              <a:t>progress__filled</a:t>
-            </a:r>
-            <a:r>
-              <a:rPr lang="en-US" altLang="ko-KR" sz="1400" b="1" dirty="0">
-                <a:solidFill>
-                  <a:srgbClr val="00B0F0"/>
-                </a:solidFill>
-              </a:rPr>
-              <a:t> : flex</a:t>
-            </a:r>
-            <a:r>
-              <a:rPr lang="ko-KR" altLang="en-US" sz="1400" b="1" dirty="0">
-                <a:solidFill>
-                  <a:srgbClr val="00B0F0"/>
-                </a:solidFill>
-              </a:rPr>
-              <a:t> 영역 </a:t>
-            </a:r>
-            <a:r>
-              <a:rPr lang="en-US" altLang="ko-KR" sz="1400" b="1" dirty="0">
-                <a:solidFill>
-                  <a:srgbClr val="00B0F0"/>
-                </a:solidFill>
-              </a:rPr>
-              <a:t>: 0</a:t>
-            </a:r>
-          </a:p>
-        </p:txBody>
-      </p:sp>
-      <p:sp>
-        <p:nvSpPr>
-          <p:cNvPr id="31" name="직사각형 30">
-            <a:extLst>
-              <a:ext uri="{FF2B5EF4-FFF2-40B4-BE49-F238E27FC236}">
-                <a16:creationId xmlns:a16="http://schemas.microsoft.com/office/drawing/2014/main" id="{E081388C-9F0B-4634-B5FA-76A4B9F2303C}"/>
-              </a:ext>
-            </a:extLst>
-          </p:cNvPr>
-          <p:cNvSpPr/>
-          <p:nvPr/>
-        </p:nvSpPr>
-        <p:spPr>
-          <a:xfrm>
-            <a:off x="643385" y="2486230"/>
-            <a:ext cx="2002162" cy="284951"/>
-          </a:xfrm>
-          <a:prstGeom prst="rect">
-            <a:avLst/>
-          </a:prstGeom>
-          <a:noFill/>
-          <a:ln w="57150">
-            <a:solidFill>
-              <a:srgbClr val="92D050"/>
-            </a:solidFill>
-          </a:ln>
-        </p:spPr>
-        <p:style>
-          <a:lnRef idx="2">
-            <a:schemeClr val="accent1">
-              <a:shade val="50000"/>
-            </a:schemeClr>
-          </a:lnRef>
-          <a:fillRef idx="1">
-            <a:schemeClr val="accent1"/>
-          </a:fillRef>
-          <a:effectRef idx="0">
-            <a:schemeClr val="accent1"/>
-          </a:effectRef>
-          <a:fontRef idx="minor">
-            <a:schemeClr val="lt1"/>
-          </a:fontRef>
-        </p:style>
-        <p:txBody>
-          <a:bodyPr rtlCol="0" anchor="ctr"/>
-          <a:lstStyle/>
-          <a:p>
-            <a:pPr algn="ctr"/>
-            <a:endParaRPr lang="ko-KR" altLang="en-US"/>
-          </a:p>
-        </p:txBody>
-      </p:sp>
-      <p:sp>
-        <p:nvSpPr>
-          <p:cNvPr id="32" name="직사각형 31">
-            <a:extLst>
-              <a:ext uri="{FF2B5EF4-FFF2-40B4-BE49-F238E27FC236}">
-                <a16:creationId xmlns:a16="http://schemas.microsoft.com/office/drawing/2014/main" id="{BCCC11EC-B6A3-41E6-A4C1-1E1FFE6AE7D7}"/>
-              </a:ext>
-            </a:extLst>
-          </p:cNvPr>
-          <p:cNvSpPr/>
-          <p:nvPr/>
-        </p:nvSpPr>
-        <p:spPr>
-          <a:xfrm>
-            <a:off x="643385" y="5728059"/>
-            <a:ext cx="2002162" cy="284951"/>
-          </a:xfrm>
-          <a:prstGeom prst="rect">
-            <a:avLst/>
-          </a:prstGeom>
-          <a:noFill/>
-          <a:ln w="57150">
-            <a:solidFill>
-              <a:srgbClr val="92D050"/>
-            </a:solidFill>
-          </a:ln>
-        </p:spPr>
-        <p:style>
-          <a:lnRef idx="2">
-            <a:schemeClr val="accent1">
-              <a:shade val="50000"/>
-            </a:schemeClr>
-          </a:lnRef>
-          <a:fillRef idx="1">
-            <a:schemeClr val="accent1"/>
-          </a:fillRef>
-          <a:effectRef idx="0">
-            <a:schemeClr val="accent1"/>
-          </a:effectRef>
-          <a:fontRef idx="minor">
-            <a:schemeClr val="lt1"/>
-          </a:fontRef>
-        </p:style>
-        <p:txBody>
-          <a:bodyPr rtlCol="0" anchor="ctr"/>
-          <a:lstStyle/>
-          <a:p>
-            <a:pPr algn="ctr"/>
-            <a:endParaRPr lang="ko-KR" altLang="en-US"/>
-          </a:p>
-        </p:txBody>
-      </p:sp>
-      <p:cxnSp>
-        <p:nvCxnSpPr>
-          <p:cNvPr id="33" name="직선 화살표 연결선 32">
-            <a:extLst>
-              <a:ext uri="{FF2B5EF4-FFF2-40B4-BE49-F238E27FC236}">
-                <a16:creationId xmlns:a16="http://schemas.microsoft.com/office/drawing/2014/main" id="{FFE50675-AB15-476B-965B-2FB5B1A9A62B}"/>
-              </a:ext>
-            </a:extLst>
-          </p:cNvPr>
-          <p:cNvCxnSpPr>
-            <a:cxnSpLocks/>
-          </p:cNvCxnSpPr>
-          <p:nvPr/>
-        </p:nvCxnSpPr>
-        <p:spPr>
-          <a:xfrm>
-            <a:off x="2663303" y="2761570"/>
-            <a:ext cx="2627146" cy="1419813"/>
-          </a:xfrm>
-          <a:prstGeom prst="straightConnector1">
-            <a:avLst/>
-          </a:prstGeom>
-          <a:ln w="57150">
-            <a:solidFill>
-              <a:srgbClr val="92D050"/>
-            </a:solidFill>
-            <a:tailEnd type="triangle"/>
-          </a:ln>
-        </p:spPr>
-        <p:style>
-          <a:lnRef idx="1">
-            <a:schemeClr val="accent1"/>
-          </a:lnRef>
-          <a:fillRef idx="0">
-            <a:schemeClr val="accent1"/>
-          </a:fillRef>
-          <a:effectRef idx="0">
-            <a:schemeClr val="accent1"/>
-          </a:effectRef>
-          <a:fontRef idx="minor">
-            <a:schemeClr val="tx1"/>
-          </a:fontRef>
-        </p:style>
-      </p:cxnSp>
-      <p:cxnSp>
-        <p:nvCxnSpPr>
-          <p:cNvPr id="35" name="직선 화살표 연결선 34">
-            <a:extLst>
-              <a:ext uri="{FF2B5EF4-FFF2-40B4-BE49-F238E27FC236}">
-                <a16:creationId xmlns:a16="http://schemas.microsoft.com/office/drawing/2014/main" id="{92EA321F-A6D4-4D01-80C6-E7B626A96271}"/>
-              </a:ext>
-            </a:extLst>
-          </p:cNvPr>
-          <p:cNvCxnSpPr>
-            <a:cxnSpLocks/>
-          </p:cNvCxnSpPr>
-          <p:nvPr/>
-        </p:nvCxnSpPr>
-        <p:spPr>
-          <a:xfrm>
-            <a:off x="5812308" y="1656962"/>
-            <a:ext cx="1119157" cy="0"/>
-          </a:xfrm>
-          <a:prstGeom prst="straightConnector1">
-            <a:avLst/>
-          </a:prstGeom>
-          <a:ln w="57150">
-            <a:solidFill>
-              <a:srgbClr val="FFC000"/>
-            </a:solidFill>
-            <a:tailEnd type="triangle"/>
-          </a:ln>
-        </p:spPr>
-        <p:style>
-          <a:lnRef idx="1">
-            <a:schemeClr val="accent1"/>
-          </a:lnRef>
-          <a:fillRef idx="0">
-            <a:schemeClr val="accent1"/>
-          </a:fillRef>
-          <a:effectRef idx="0">
-            <a:schemeClr val="accent1"/>
-          </a:effectRef>
-          <a:fontRef idx="minor">
-            <a:schemeClr val="tx1"/>
-          </a:fontRef>
-        </p:style>
-      </p:cxnSp>
-    </p:spTree>
-    <p:extLst>
-      <p:ext uri="{BB962C8B-B14F-4D97-AF65-F5344CB8AC3E}">
-        <p14:creationId xmlns:p14="http://schemas.microsoft.com/office/powerpoint/2010/main" val="988415361"/>
-      </p:ext>
-    </p:extLst>
-  </p:cSld>
-  <p:clrMapOvr>
-    <a:masterClrMapping/>
-  </p:clrMapOvr>
-</p:sld>
-</file>
-
-<file path=ppt/slides/slide4.xml><?xml version="1.0" encoding="utf-8"?>
 <p:sld xmlns:a="http://schemas.openxmlformats.org/drawingml/2006/main" xmlns:r="http://schemas.openxmlformats.org/officeDocument/2006/relationships" xmlns:p="http://schemas.openxmlformats.org/presentationml/2006/main">
   <p:cSld>
     <p:spTree>
@@ -6891,7 +4342,7 @@
 </p:sld>
 </file>
 
-<file path=ppt/slides/slide5.xml><?xml version="1.0" encoding="utf-8"?>
+<file path=ppt/slides/slide2.xml><?xml version="1.0" encoding="utf-8"?>
 <p:sld xmlns:a="http://schemas.openxmlformats.org/drawingml/2006/main" xmlns:r="http://schemas.openxmlformats.org/officeDocument/2006/relationships" xmlns:p="http://schemas.openxmlformats.org/presentationml/2006/main">
   <p:cSld>
     <p:spTree>
@@ -7564,7 +5015,7 @@
 </p:sld>
 </file>
 
-<file path=ppt/slides/slide6.xml><?xml version="1.0" encoding="utf-8"?>
+<file path=ppt/slides/slide3.xml><?xml version="1.0" encoding="utf-8"?>
 <p:sld xmlns:a="http://schemas.openxmlformats.org/drawingml/2006/main" xmlns:r="http://schemas.openxmlformats.org/officeDocument/2006/relationships" xmlns:p="http://schemas.openxmlformats.org/presentationml/2006/main">
   <p:cSld>
     <p:spTree>
@@ -8312,7 +5763,7 @@
 </p:sld>
 </file>
 
-<file path=ppt/slides/slide7.xml><?xml version="1.0" encoding="utf-8"?>
+<file path=ppt/slides/slide4.xml><?xml version="1.0" encoding="utf-8"?>
 <p:sld xmlns:a="http://schemas.openxmlformats.org/drawingml/2006/main" xmlns:r="http://schemas.openxmlformats.org/officeDocument/2006/relationships" xmlns:p="http://schemas.openxmlformats.org/presentationml/2006/main">
   <p:cSld>
     <p:spTree>
@@ -8694,7 +6145,7 @@
 </p:sld>
 </file>
 
-<file path=ppt/slides/slide8.xml><?xml version="1.0" encoding="utf-8"?>
+<file path=ppt/slides/slide5.xml><?xml version="1.0" encoding="utf-8"?>
 <p:sld xmlns:a="http://schemas.openxmlformats.org/drawingml/2006/main" xmlns:r="http://schemas.openxmlformats.org/officeDocument/2006/relationships" xmlns:p="http://schemas.openxmlformats.org/presentationml/2006/main">
   <p:cSld>
     <p:spTree>
@@ -9509,7 +6960,7 @@
 </p:sld>
 </file>
 
-<file path=ppt/slides/slide9.xml><?xml version="1.0" encoding="utf-8"?>
+<file path=ppt/slides/slide6.xml><?xml version="1.0" encoding="utf-8"?>
 <p:sld xmlns:a="http://schemas.openxmlformats.org/drawingml/2006/main" xmlns:r="http://schemas.openxmlformats.org/officeDocument/2006/relationships" xmlns:p="http://schemas.openxmlformats.org/presentationml/2006/main">
   <p:cSld>
     <p:spTree>

</xml_diff>